<commit_message>
added unique id generator for stateful and stateless system
</commit_message>
<xml_diff>
--- a/[Jason Yang] Wk 4 (Ch 7).pptx
+++ b/[Jason Yang] Wk 4 (Ch 7).pptx
@@ -10,12 +10,15 @@
     <p:sldId id="259" r:id="rId4"/>
     <p:sldId id="260" r:id="rId5"/>
     <p:sldId id="261" r:id="rId6"/>
-    <p:sldId id="262" r:id="rId7"/>
-    <p:sldId id="263" r:id="rId8"/>
-    <p:sldId id="264" r:id="rId9"/>
-    <p:sldId id="265" r:id="rId10"/>
-    <p:sldId id="267" r:id="rId11"/>
-    <p:sldId id="268" r:id="rId12"/>
+    <p:sldId id="269" r:id="rId7"/>
+    <p:sldId id="262" r:id="rId8"/>
+    <p:sldId id="263" r:id="rId9"/>
+    <p:sldId id="264" r:id="rId10"/>
+    <p:sldId id="265" r:id="rId11"/>
+    <p:sldId id="267" r:id="rId12"/>
+    <p:sldId id="268" r:id="rId13"/>
+    <p:sldId id="271" r:id="rId14"/>
+    <p:sldId id="272" r:id="rId15"/>
   </p:sldIdLst>
   <p:sldSz cx="12192000" cy="6858000"/>
   <p:notesSz cx="6858000" cy="9144000"/>
@@ -269,7 +272,7 @@
           <a:p>
             <a:fld id="{15752B4B-EDB2-4AE2-A679-01309A28A03F}" type="datetimeFigureOut">
               <a:rPr lang="ko-KR" altLang="en-US" smtClean="0"/>
-              <a:t>2024-02-26</a:t>
+              <a:t>2024-02-27</a:t>
             </a:fld>
             <a:endParaRPr lang="ko-KR" altLang="en-US"/>
           </a:p>
@@ -707,7 +710,7 @@
           <a:p>
             <a:fld id="{15752B4B-EDB2-4AE2-A679-01309A28A03F}" type="datetimeFigureOut">
               <a:rPr lang="ko-KR" altLang="en-US" smtClean="0"/>
-              <a:t>2024-02-26</a:t>
+              <a:t>2024-02-27</a:t>
             </a:fld>
             <a:endParaRPr lang="ko-KR" altLang="en-US"/>
           </a:p>
@@ -1340,7 +1343,7 @@
           <a:p>
             <a:fld id="{15752B4B-EDB2-4AE2-A679-01309A28A03F}" type="datetimeFigureOut">
               <a:rPr lang="ko-KR" altLang="en-US" smtClean="0"/>
-              <a:t>2024-02-26</a:t>
+              <a:t>2024-02-27</a:t>
             </a:fld>
             <a:endParaRPr lang="ko-KR" altLang="en-US"/>
           </a:p>
@@ -1832,7 +1835,7 @@
           <a:p>
             <a:r>
               <a:rPr lang="en-US" altLang="ko-KR" dirty="0"/>
-              <a:t>2022-10-03</a:t>
+              <a:t>2024-02-27</a:t>
             </a:r>
             <a:endParaRPr lang="ko-KR" altLang="en-US" dirty="0"/>
           </a:p>
@@ -1856,7 +1859,13 @@
   <p:cSld>
     <p:spTree>
       <p:nvGrpSpPr>
-        <p:cNvPr id="1" name=""/>
+        <p:cNvPr id="1" name="">
+          <a:extLst>
+            <a:ext uri="{FF2B5EF4-FFF2-40B4-BE49-F238E27FC236}">
+              <a16:creationId xmlns:a16="http://schemas.microsoft.com/office/drawing/2014/main" id="{F8B80F7B-B0FF-57D0-DD45-82D5E5C7E5F7}"/>
+            </a:ext>
+          </a:extLst>
+        </p:cNvPr>
         <p:cNvGrpSpPr/>
         <p:nvPr/>
       </p:nvGrpSpPr>
@@ -1873,7 +1882,7 @@
           <p:cNvPr id="2" name="제목 1">
             <a:extLst>
               <a:ext uri="{FF2B5EF4-FFF2-40B4-BE49-F238E27FC236}">
-                <a16:creationId xmlns:a16="http://schemas.microsoft.com/office/drawing/2014/main" id="{EC44174D-BDB8-F70F-D4A4-CF54AB84D7FF}"/>
+                <a16:creationId xmlns:a16="http://schemas.microsoft.com/office/drawing/2014/main" id="{A4390147-0449-26B2-1341-5DE341E5511A}"/>
               </a:ext>
             </a:extLst>
           </p:cNvPr>
@@ -1890,8 +1899,8 @@
           <a:lstStyle/>
           <a:p>
             <a:r>
-              <a:rPr lang="en-CA" altLang="ko-KR" dirty="0"/>
-              <a:t>Step 4 - Wrap up</a:t>
+              <a:rPr lang="en-US" altLang="ko-KR" dirty="0"/>
+              <a:t>Step 3 - Design deep dive (Twitter snowflake approach)</a:t>
             </a:r>
             <a:endParaRPr lang="ko-KR" altLang="en-US" dirty="0"/>
           </a:p>
@@ -1902,7 +1911,7 @@
           <p:cNvPr id="3" name="내용 개체 틀 2">
             <a:extLst>
               <a:ext uri="{FF2B5EF4-FFF2-40B4-BE49-F238E27FC236}">
-                <a16:creationId xmlns:a16="http://schemas.microsoft.com/office/drawing/2014/main" id="{16772708-6ABC-5C58-9C00-1E0866796D89}"/>
+                <a16:creationId xmlns:a16="http://schemas.microsoft.com/office/drawing/2014/main" id="{5439E027-BE35-AF19-A722-65259F8454D5}"/>
               </a:ext>
             </a:extLst>
           </p:cNvPr>
@@ -1929,6 +1938,166 @@
               <a:buNone/>
             </a:pPr>
             <a:r>
+              <a:rPr lang="en-CA" altLang="ko-KR" b="1" dirty="0"/>
+              <a:t>Sequence number</a:t>
+            </a:r>
+          </a:p>
+          <a:p>
+            <a:r>
+              <a:rPr lang="en-US" altLang="ko-KR" sz="1600" dirty="0">
+                <a:latin typeface="LiberationSerif"/>
+              </a:rPr>
+              <a:t>Sequence number is 12 bits, which give us 2 ^ 12 = 4096 combinations.</a:t>
+            </a:r>
+          </a:p>
+          <a:p>
+            <a:r>
+              <a:rPr lang="en-US" altLang="ko-KR" sz="1600" dirty="0">
+                <a:latin typeface="LiberationSerif"/>
+              </a:rPr>
+              <a:t>This field is 0 unless more than one ID is generated in a millisecond on the same server.</a:t>
+            </a:r>
+          </a:p>
+          <a:p>
+            <a:r>
+              <a:rPr lang="en-US" altLang="ko-KR" sz="1600" dirty="0">
+                <a:solidFill>
+                  <a:srgbClr val="FF0000"/>
+                </a:solidFill>
+                <a:latin typeface="LiberationSerif"/>
+              </a:rPr>
+              <a:t>In theory, a machine can support a maximum of 4096 new IDs per millisecond.</a:t>
+            </a:r>
+            <a:endParaRPr lang="en-US" altLang="ko-KR" sz="1400" dirty="0">
+              <a:solidFill>
+                <a:srgbClr val="FF0000"/>
+              </a:solidFill>
+              <a:latin typeface="LiberationSerif"/>
+            </a:endParaRPr>
+          </a:p>
+        </p:txBody>
+      </p:sp>
+      <p:pic>
+        <p:nvPicPr>
+          <p:cNvPr id="6" name="그림 5">
+            <a:extLst>
+              <a:ext uri="{FF2B5EF4-FFF2-40B4-BE49-F238E27FC236}">
+                <a16:creationId xmlns:a16="http://schemas.microsoft.com/office/drawing/2014/main" id="{1696FB22-6699-F088-3040-3F381A529004}"/>
+              </a:ext>
+            </a:extLst>
+          </p:cNvPr>
+          <p:cNvPicPr>
+            <a:picLocks noChangeAspect="1"/>
+          </p:cNvPicPr>
+          <p:nvPr/>
+        </p:nvPicPr>
+        <p:blipFill>
+          <a:blip r:embed="rId2"/>
+          <a:stretch>
+            <a:fillRect/>
+          </a:stretch>
+        </p:blipFill>
+        <p:spPr>
+          <a:xfrm>
+            <a:off x="6096000" y="1280628"/>
+            <a:ext cx="5986432" cy="977541"/>
+          </a:xfrm>
+          <a:prstGeom prst="rect">
+            <a:avLst/>
+          </a:prstGeom>
+        </p:spPr>
+      </p:pic>
+    </p:spTree>
+    <p:extLst>
+      <p:ext uri="{BB962C8B-B14F-4D97-AF65-F5344CB8AC3E}">
+        <p14:creationId xmlns:p14="http://schemas.microsoft.com/office/powerpoint/2010/main" val="1482568066"/>
+      </p:ext>
+    </p:extLst>
+  </p:cSld>
+  <p:clrMapOvr>
+    <a:masterClrMapping/>
+  </p:clrMapOvr>
+</p:sld>
+</file>
+
+<file path=ppt/slides/slide11.xml><?xml version="1.0" encoding="utf-8"?>
+<p:sld xmlns:a="http://schemas.openxmlformats.org/drawingml/2006/main" xmlns:r="http://schemas.openxmlformats.org/officeDocument/2006/relationships" xmlns:p="http://schemas.openxmlformats.org/presentationml/2006/main">
+  <p:cSld>
+    <p:spTree>
+      <p:nvGrpSpPr>
+        <p:cNvPr id="1" name=""/>
+        <p:cNvGrpSpPr/>
+        <p:nvPr/>
+      </p:nvGrpSpPr>
+      <p:grpSpPr>
+        <a:xfrm>
+          <a:off x="0" y="0"/>
+          <a:ext cx="0" cy="0"/>
+          <a:chOff x="0" y="0"/>
+          <a:chExt cx="0" cy="0"/>
+        </a:xfrm>
+      </p:grpSpPr>
+      <p:sp>
+        <p:nvSpPr>
+          <p:cNvPr id="2" name="제목 1">
+            <a:extLst>
+              <a:ext uri="{FF2B5EF4-FFF2-40B4-BE49-F238E27FC236}">
+                <a16:creationId xmlns:a16="http://schemas.microsoft.com/office/drawing/2014/main" id="{EC44174D-BDB8-F70F-D4A4-CF54AB84D7FF}"/>
+              </a:ext>
+            </a:extLst>
+          </p:cNvPr>
+          <p:cNvSpPr>
+            <a:spLocks noGrp="1"/>
+          </p:cNvSpPr>
+          <p:nvPr>
+            <p:ph type="title"/>
+          </p:nvPr>
+        </p:nvSpPr>
+        <p:spPr/>
+        <p:txBody>
+          <a:bodyPr/>
+          <a:lstStyle/>
+          <a:p>
+            <a:r>
+              <a:rPr lang="en-CA" altLang="ko-KR" dirty="0"/>
+              <a:t>Step 4 - Wrap up</a:t>
+            </a:r>
+            <a:endParaRPr lang="ko-KR" altLang="en-US" dirty="0"/>
+          </a:p>
+        </p:txBody>
+      </p:sp>
+      <p:sp>
+        <p:nvSpPr>
+          <p:cNvPr id="3" name="내용 개체 틀 2">
+            <a:extLst>
+              <a:ext uri="{FF2B5EF4-FFF2-40B4-BE49-F238E27FC236}">
+                <a16:creationId xmlns:a16="http://schemas.microsoft.com/office/drawing/2014/main" id="{16772708-6ABC-5C58-9C00-1E0866796D89}"/>
+              </a:ext>
+            </a:extLst>
+          </p:cNvPr>
+          <p:cNvSpPr>
+            <a:spLocks noGrp="1"/>
+          </p:cNvSpPr>
+          <p:nvPr>
+            <p:ph idx="1"/>
+          </p:nvPr>
+        </p:nvSpPr>
+        <p:spPr>
+          <a:xfrm>
+            <a:off x="372862" y="1260629"/>
+            <a:ext cx="5723138" cy="5232246"/>
+          </a:xfrm>
+        </p:spPr>
+        <p:txBody>
+          <a:bodyPr>
+            <a:normAutofit/>
+          </a:bodyPr>
+          <a:lstStyle/>
+          <a:p>
+            <a:pPr marL="0" indent="0">
+              <a:buNone/>
+            </a:pPr>
+            <a:r>
               <a:rPr lang="en-US" altLang="ko-KR" b="1" dirty="0"/>
               <a:t>Clock synchronization.</a:t>
             </a:r>
@@ -1951,10 +2120,112 @@
           </a:p>
           <a:p>
             <a:r>
-              <a:rPr lang="en-US" altLang="ko-KR" sz="1600" dirty="0">
-                <a:latin typeface="LiberationSerif"/>
-              </a:rPr>
-              <a:t>Solutions to clock synchronization are out of the scope of this book; however, it is important to understand the problem exists. Network Time Protocol is the most popular solution to this problem. For interested readers, refer to the reference material [4].</a:t>
+              <a:rPr lang="ko-KR" altLang="en-US" sz="1600" dirty="0">
+                <a:latin typeface="LiberationSerif"/>
+              </a:rPr>
+              <a:t>멀티 코어 컴퓨터에서 시간 동기화 문제가 발생하는 주요 이유는 각 코어가 독립적인 </a:t>
+            </a:r>
+            <a:r>
+              <a:rPr lang="ko-KR" altLang="en-US" sz="1600" dirty="0" err="1">
+                <a:latin typeface="LiberationSerif"/>
+              </a:rPr>
+              <a:t>클록을</a:t>
+            </a:r>
+            <a:r>
+              <a:rPr lang="ko-KR" altLang="en-US" sz="1600" dirty="0">
+                <a:latin typeface="LiberationSerif"/>
+              </a:rPr>
+              <a:t> 가질 수 있기 때문입니다</a:t>
+            </a:r>
+            <a:endParaRPr lang="en-US" altLang="ko-KR" sz="1600" dirty="0">
+              <a:latin typeface="LiberationSerif"/>
+            </a:endParaRPr>
+          </a:p>
+          <a:p>
+            <a:r>
+              <a:rPr lang="ko-KR" altLang="en-US" sz="1600" dirty="0">
+                <a:latin typeface="LiberationSerif"/>
+              </a:rPr>
+              <a:t>이는 시스템 내부에서 다양한 코어 간의 시간 차이를 초래할 수 있으며</a:t>
+            </a:r>
+            <a:r>
+              <a:rPr lang="en-US" altLang="ko-KR" sz="1600" dirty="0">
+                <a:latin typeface="LiberationSerif"/>
+              </a:rPr>
+              <a:t>, </a:t>
+            </a:r>
+            <a:r>
+              <a:rPr lang="ko-KR" altLang="en-US" sz="1600" dirty="0">
+                <a:latin typeface="LiberationSerif"/>
+              </a:rPr>
+              <a:t>이로 인해 데이터의 일관성과 순서가 올바르게 유지되지 않을 수 있습니다</a:t>
+            </a:r>
+            <a:r>
+              <a:rPr lang="en-US" altLang="ko-KR" sz="1600" dirty="0">
+                <a:latin typeface="LiberationSerif"/>
+              </a:rPr>
+              <a:t>.</a:t>
+            </a:r>
+          </a:p>
+          <a:p>
+            <a:r>
+              <a:rPr lang="ko-KR" altLang="en-US" sz="1600" dirty="0">
+                <a:latin typeface="LiberationSerif"/>
+              </a:rPr>
+              <a:t>예를 들어</a:t>
+            </a:r>
+            <a:r>
+              <a:rPr lang="en-US" altLang="ko-KR" sz="1600" dirty="0">
+                <a:latin typeface="LiberationSerif"/>
+              </a:rPr>
+              <a:t>, </a:t>
+            </a:r>
+            <a:r>
+              <a:rPr lang="ko-KR" altLang="en-US" sz="1600" dirty="0">
+                <a:latin typeface="LiberationSerif"/>
+              </a:rPr>
+              <a:t>멀티 코어 시스템에서 동시에 실행되는 두 프로세스가 서로 다른 코어에서 작동할 때</a:t>
+            </a:r>
+            <a:r>
+              <a:rPr lang="en-US" altLang="ko-KR" sz="1600" dirty="0">
+                <a:latin typeface="LiberationSerif"/>
+              </a:rPr>
+              <a:t>, </a:t>
+            </a:r>
+            <a:r>
+              <a:rPr lang="ko-KR" altLang="en-US" sz="1600" dirty="0">
+                <a:latin typeface="LiberationSerif"/>
+              </a:rPr>
+              <a:t>각각의 코어가 다른 시간을 기준으로 작업을 수행하면 결과적으로 시간 순서가 뒤바뀔 수 있습니다</a:t>
+            </a:r>
+            <a:r>
+              <a:rPr lang="en-US" altLang="ko-KR" sz="1600" dirty="0">
+                <a:latin typeface="LiberationSerif"/>
+              </a:rPr>
+              <a:t>.</a:t>
+            </a:r>
+          </a:p>
+          <a:p>
+            <a:r>
+              <a:rPr lang="en-US" altLang="ko-KR" sz="1600" dirty="0">
+                <a:latin typeface="LiberationSerif"/>
+              </a:rPr>
+              <a:t>Solutions to clock synchronization are out of the scope of this book; however, it is important to understand the problem exists. </a:t>
+            </a:r>
+            <a:r>
+              <a:rPr lang="en-US" altLang="ko-KR" sz="1600" dirty="0">
+                <a:solidFill>
+                  <a:srgbClr val="FF0000"/>
+                </a:solidFill>
+                <a:latin typeface="LiberationSerif"/>
+              </a:rPr>
+              <a:t>Network Time Protocol </a:t>
+            </a:r>
+            <a:r>
+              <a:rPr lang="en-US" altLang="ko-KR" sz="1600" dirty="0">
+                <a:latin typeface="LiberationSerif"/>
+              </a:rPr>
+              <a:t>is the most popular solution to this problem. For interested readers, refer to the reference material [4].</a:t>
             </a:r>
           </a:p>
           <a:p>
@@ -2214,7 +2485,7 @@
 </p:sld>
 </file>
 
-<file path=ppt/slides/slide11.xml><?xml version="1.0" encoding="utf-8"?>
+<file path=ppt/slides/slide12.xml><?xml version="1.0" encoding="utf-8"?>
 <p:sld xmlns:a="http://schemas.openxmlformats.org/drawingml/2006/main" xmlns:r="http://schemas.openxmlformats.org/officeDocument/2006/relationships" xmlns:p="http://schemas.openxmlformats.org/presentationml/2006/main">
   <p:cSld>
     <p:spTree>
@@ -2373,6 +2644,1425 @@
     <p:extLst>
       <p:ext uri="{BB962C8B-B14F-4D97-AF65-F5344CB8AC3E}">
         <p14:creationId xmlns:p14="http://schemas.microsoft.com/office/powerpoint/2010/main" val="1993893583"/>
+      </p:ext>
+    </p:extLst>
+  </p:cSld>
+  <p:clrMapOvr>
+    <a:masterClrMapping/>
+  </p:clrMapOvr>
+</p:sld>
+</file>
+
+<file path=ppt/slides/slide13.xml><?xml version="1.0" encoding="utf-8"?>
+<p:sld xmlns:a="http://schemas.openxmlformats.org/drawingml/2006/main" xmlns:r="http://schemas.openxmlformats.org/officeDocument/2006/relationships" xmlns:p="http://schemas.openxmlformats.org/presentationml/2006/main">
+  <p:cSld>
+    <p:spTree>
+      <p:nvGrpSpPr>
+        <p:cNvPr id="1" name=""/>
+        <p:cNvGrpSpPr/>
+        <p:nvPr/>
+      </p:nvGrpSpPr>
+      <p:grpSpPr>
+        <a:xfrm>
+          <a:off x="0" y="0"/>
+          <a:ext cx="0" cy="0"/>
+          <a:chOff x="0" y="0"/>
+          <a:chExt cx="0" cy="0"/>
+        </a:xfrm>
+      </p:grpSpPr>
+      <p:sp>
+        <p:nvSpPr>
+          <p:cNvPr id="4" name="타원 3">
+            <a:extLst>
+              <a:ext uri="{FF2B5EF4-FFF2-40B4-BE49-F238E27FC236}">
+                <a16:creationId xmlns:a16="http://schemas.microsoft.com/office/drawing/2014/main" id="{ACD9774A-FB26-2331-63B3-BBCAD4AC65E2}"/>
+              </a:ext>
+            </a:extLst>
+          </p:cNvPr>
+          <p:cNvSpPr/>
+          <p:nvPr/>
+        </p:nvSpPr>
+        <p:spPr>
+          <a:xfrm>
+            <a:off x="1062844" y="2781796"/>
+            <a:ext cx="1579418" cy="1579418"/>
+          </a:xfrm>
+          <a:prstGeom prst="ellipse">
+            <a:avLst/>
+          </a:prstGeom>
+        </p:spPr>
+        <p:style>
+          <a:lnRef idx="2">
+            <a:schemeClr val="accent1">
+              <a:shade val="15000"/>
+            </a:schemeClr>
+          </a:lnRef>
+          <a:fillRef idx="1">
+            <a:schemeClr val="accent1"/>
+          </a:fillRef>
+          <a:effectRef idx="0">
+            <a:schemeClr val="accent1"/>
+          </a:effectRef>
+          <a:fontRef idx="minor">
+            <a:schemeClr val="lt1"/>
+          </a:fontRef>
+        </p:style>
+        <p:txBody>
+          <a:bodyPr rtlCol="0" anchor="ctr"/>
+          <a:lstStyle/>
+          <a:p>
+            <a:pPr algn="ctr"/>
+            <a:r>
+              <a:rPr lang="en-US" altLang="ko-KR" dirty="0"/>
+              <a:t>Client</a:t>
+            </a:r>
+          </a:p>
+          <a:p>
+            <a:pPr algn="ctr"/>
+            <a:r>
+              <a:rPr lang="en-US" altLang="ko-KR" dirty="0"/>
+              <a:t>interface</a:t>
+            </a:r>
+            <a:endParaRPr lang="ko-KR" altLang="en-US" dirty="0"/>
+          </a:p>
+        </p:txBody>
+      </p:sp>
+      <p:sp>
+        <p:nvSpPr>
+          <p:cNvPr id="5" name="타원 4">
+            <a:extLst>
+              <a:ext uri="{FF2B5EF4-FFF2-40B4-BE49-F238E27FC236}">
+                <a16:creationId xmlns:a16="http://schemas.microsoft.com/office/drawing/2014/main" id="{08934856-0608-7FD1-2737-3DBFCF2CF0D0}"/>
+              </a:ext>
+            </a:extLst>
+          </p:cNvPr>
+          <p:cNvSpPr/>
+          <p:nvPr/>
+        </p:nvSpPr>
+        <p:spPr>
+          <a:xfrm>
+            <a:off x="4142511" y="2737263"/>
+            <a:ext cx="1656607" cy="1656607"/>
+          </a:xfrm>
+          <a:prstGeom prst="ellipse">
+            <a:avLst/>
+          </a:prstGeom>
+        </p:spPr>
+        <p:style>
+          <a:lnRef idx="2">
+            <a:schemeClr val="accent1">
+              <a:shade val="15000"/>
+            </a:schemeClr>
+          </a:lnRef>
+          <a:fillRef idx="1">
+            <a:schemeClr val="accent1"/>
+          </a:fillRef>
+          <a:effectRef idx="0">
+            <a:schemeClr val="accent1"/>
+          </a:effectRef>
+          <a:fontRef idx="minor">
+            <a:schemeClr val="lt1"/>
+          </a:fontRef>
+        </p:style>
+        <p:txBody>
+          <a:bodyPr rtlCol="0" anchor="ctr"/>
+          <a:lstStyle/>
+          <a:p>
+            <a:pPr algn="ctr"/>
+            <a:r>
+              <a:rPr lang="en-US" altLang="ko-KR" dirty="0"/>
+              <a:t>Server</a:t>
+            </a:r>
+          </a:p>
+          <a:p>
+            <a:pPr algn="ctr"/>
+            <a:r>
+              <a:rPr lang="en-US" altLang="ko-KR" dirty="0"/>
+              <a:t>interface</a:t>
+            </a:r>
+            <a:endParaRPr lang="ko-KR" altLang="en-US" dirty="0"/>
+          </a:p>
+        </p:txBody>
+      </p:sp>
+      <p:sp>
+        <p:nvSpPr>
+          <p:cNvPr id="6" name="사각형: 둥근 모서리 5">
+            <a:extLst>
+              <a:ext uri="{FF2B5EF4-FFF2-40B4-BE49-F238E27FC236}">
+                <a16:creationId xmlns:a16="http://schemas.microsoft.com/office/drawing/2014/main" id="{9BC6562F-6D72-CE08-03A1-951EF125C443}"/>
+              </a:ext>
+            </a:extLst>
+          </p:cNvPr>
+          <p:cNvSpPr/>
+          <p:nvPr/>
+        </p:nvSpPr>
+        <p:spPr>
+          <a:xfrm>
+            <a:off x="3675413" y="1864428"/>
+            <a:ext cx="7243948" cy="3218213"/>
+          </a:xfrm>
+          <a:prstGeom prst="roundRect">
+            <a:avLst/>
+          </a:prstGeom>
+          <a:noFill/>
+        </p:spPr>
+        <p:style>
+          <a:lnRef idx="2">
+            <a:schemeClr val="accent1">
+              <a:shade val="15000"/>
+            </a:schemeClr>
+          </a:lnRef>
+          <a:fillRef idx="1">
+            <a:schemeClr val="accent1"/>
+          </a:fillRef>
+          <a:effectRef idx="0">
+            <a:schemeClr val="accent1"/>
+          </a:effectRef>
+          <a:fontRef idx="minor">
+            <a:schemeClr val="lt1"/>
+          </a:fontRef>
+        </p:style>
+        <p:txBody>
+          <a:bodyPr rtlCol="0" anchor="ctr"/>
+          <a:lstStyle/>
+          <a:p>
+            <a:pPr algn="ctr"/>
+            <a:endParaRPr lang="ko-KR" altLang="en-US"/>
+          </a:p>
+        </p:txBody>
+      </p:sp>
+      <p:sp>
+        <p:nvSpPr>
+          <p:cNvPr id="7" name="타원 6">
+            <a:extLst>
+              <a:ext uri="{FF2B5EF4-FFF2-40B4-BE49-F238E27FC236}">
+                <a16:creationId xmlns:a16="http://schemas.microsoft.com/office/drawing/2014/main" id="{DABB227A-66E5-7F52-572A-65F08754D019}"/>
+              </a:ext>
+            </a:extLst>
+          </p:cNvPr>
+          <p:cNvSpPr/>
+          <p:nvPr/>
+        </p:nvSpPr>
+        <p:spPr>
+          <a:xfrm>
+            <a:off x="6466116" y="2737263"/>
+            <a:ext cx="1656607" cy="1656607"/>
+          </a:xfrm>
+          <a:prstGeom prst="ellipse">
+            <a:avLst/>
+          </a:prstGeom>
+        </p:spPr>
+        <p:style>
+          <a:lnRef idx="2">
+            <a:schemeClr val="accent1">
+              <a:shade val="15000"/>
+            </a:schemeClr>
+          </a:lnRef>
+          <a:fillRef idx="1">
+            <a:schemeClr val="accent1"/>
+          </a:fillRef>
+          <a:effectRef idx="0">
+            <a:schemeClr val="accent1"/>
+          </a:effectRef>
+          <a:fontRef idx="minor">
+            <a:schemeClr val="lt1"/>
+          </a:fontRef>
+        </p:style>
+        <p:txBody>
+          <a:bodyPr rtlCol="0" anchor="ctr"/>
+          <a:lstStyle/>
+          <a:p>
+            <a:pPr algn="ctr"/>
+            <a:r>
+              <a:rPr lang="en-US" altLang="ko-KR" dirty="0"/>
+              <a:t>Core</a:t>
+            </a:r>
+            <a:endParaRPr lang="ko-KR" altLang="en-US" dirty="0"/>
+          </a:p>
+        </p:txBody>
+      </p:sp>
+      <p:sp>
+        <p:nvSpPr>
+          <p:cNvPr id="8" name="타원 7">
+            <a:extLst>
+              <a:ext uri="{FF2B5EF4-FFF2-40B4-BE49-F238E27FC236}">
+                <a16:creationId xmlns:a16="http://schemas.microsoft.com/office/drawing/2014/main" id="{1632CF9F-566F-2173-84BD-CD859FE29858}"/>
+              </a:ext>
+            </a:extLst>
+          </p:cNvPr>
+          <p:cNvSpPr/>
+          <p:nvPr/>
+        </p:nvSpPr>
+        <p:spPr>
+          <a:xfrm>
+            <a:off x="8746178" y="2743201"/>
+            <a:ext cx="1656607" cy="1656607"/>
+          </a:xfrm>
+          <a:prstGeom prst="ellipse">
+            <a:avLst/>
+          </a:prstGeom>
+        </p:spPr>
+        <p:style>
+          <a:lnRef idx="2">
+            <a:schemeClr val="accent1">
+              <a:shade val="15000"/>
+            </a:schemeClr>
+          </a:lnRef>
+          <a:fillRef idx="1">
+            <a:schemeClr val="accent1"/>
+          </a:fillRef>
+          <a:effectRef idx="0">
+            <a:schemeClr val="accent1"/>
+          </a:effectRef>
+          <a:fontRef idx="minor">
+            <a:schemeClr val="lt1"/>
+          </a:fontRef>
+        </p:style>
+        <p:txBody>
+          <a:bodyPr rtlCol="0" anchor="ctr"/>
+          <a:lstStyle/>
+          <a:p>
+            <a:pPr algn="ctr"/>
+            <a:r>
+              <a:rPr lang="en-US" altLang="ko-KR" dirty="0"/>
+              <a:t>DB</a:t>
+            </a:r>
+            <a:endParaRPr lang="ko-KR" altLang="en-US" dirty="0"/>
+          </a:p>
+        </p:txBody>
+      </p:sp>
+      <p:cxnSp>
+        <p:nvCxnSpPr>
+          <p:cNvPr id="10" name="직선 화살표 연결선 9">
+            <a:extLst>
+              <a:ext uri="{FF2B5EF4-FFF2-40B4-BE49-F238E27FC236}">
+                <a16:creationId xmlns:a16="http://schemas.microsoft.com/office/drawing/2014/main" id="{6C742AF8-040E-DF1D-35BF-943E0D662572}"/>
+              </a:ext>
+            </a:extLst>
+          </p:cNvPr>
+          <p:cNvCxnSpPr>
+            <a:cxnSpLocks/>
+          </p:cNvCxnSpPr>
+          <p:nvPr/>
+        </p:nvCxnSpPr>
+        <p:spPr>
+          <a:xfrm flipV="1">
+            <a:off x="2642262" y="3571505"/>
+            <a:ext cx="1500249" cy="5938"/>
+          </a:xfrm>
+          <a:prstGeom prst="straightConnector1">
+            <a:avLst/>
+          </a:prstGeom>
+          <a:ln w="19050">
+            <a:solidFill>
+              <a:srgbClr val="00B0F0"/>
+            </a:solidFill>
+            <a:headEnd type="triangle"/>
+            <a:tailEnd type="triangle"/>
+          </a:ln>
+        </p:spPr>
+        <p:style>
+          <a:lnRef idx="1">
+            <a:schemeClr val="accent1"/>
+          </a:lnRef>
+          <a:fillRef idx="0">
+            <a:schemeClr val="accent1"/>
+          </a:fillRef>
+          <a:effectRef idx="0">
+            <a:schemeClr val="accent1"/>
+          </a:effectRef>
+          <a:fontRef idx="minor">
+            <a:schemeClr val="tx1"/>
+          </a:fontRef>
+        </p:style>
+      </p:cxnSp>
+      <p:cxnSp>
+        <p:nvCxnSpPr>
+          <p:cNvPr id="11" name="직선 화살표 연결선 10">
+            <a:extLst>
+              <a:ext uri="{FF2B5EF4-FFF2-40B4-BE49-F238E27FC236}">
+                <a16:creationId xmlns:a16="http://schemas.microsoft.com/office/drawing/2014/main" id="{FBFE098E-C057-3663-1E6D-A3E2DCFDB43D}"/>
+              </a:ext>
+            </a:extLst>
+          </p:cNvPr>
+          <p:cNvCxnSpPr>
+            <a:cxnSpLocks/>
+            <a:stCxn id="5" idx="6"/>
+            <a:endCxn id="7" idx="2"/>
+          </p:cNvCxnSpPr>
+          <p:nvPr/>
+        </p:nvCxnSpPr>
+        <p:spPr>
+          <a:xfrm>
+            <a:off x="5799118" y="3565567"/>
+            <a:ext cx="666998" cy="0"/>
+          </a:xfrm>
+          <a:prstGeom prst="straightConnector1">
+            <a:avLst/>
+          </a:prstGeom>
+          <a:ln w="19050">
+            <a:solidFill>
+              <a:srgbClr val="C00000"/>
+            </a:solidFill>
+            <a:headEnd type="triangle"/>
+            <a:tailEnd type="triangle"/>
+          </a:ln>
+        </p:spPr>
+        <p:style>
+          <a:lnRef idx="1">
+            <a:schemeClr val="accent1"/>
+          </a:lnRef>
+          <a:fillRef idx="0">
+            <a:schemeClr val="accent1"/>
+          </a:fillRef>
+          <a:effectRef idx="0">
+            <a:schemeClr val="accent1"/>
+          </a:effectRef>
+          <a:fontRef idx="minor">
+            <a:schemeClr val="tx1"/>
+          </a:fontRef>
+        </p:style>
+      </p:cxnSp>
+      <p:cxnSp>
+        <p:nvCxnSpPr>
+          <p:cNvPr id="15" name="직선 화살표 연결선 14">
+            <a:extLst>
+              <a:ext uri="{FF2B5EF4-FFF2-40B4-BE49-F238E27FC236}">
+                <a16:creationId xmlns:a16="http://schemas.microsoft.com/office/drawing/2014/main" id="{6C39FF91-CC96-9A1A-30E9-92315FDD8D40}"/>
+              </a:ext>
+            </a:extLst>
+          </p:cNvPr>
+          <p:cNvCxnSpPr>
+            <a:cxnSpLocks/>
+            <a:stCxn id="7" idx="6"/>
+            <a:endCxn id="8" idx="2"/>
+          </p:cNvCxnSpPr>
+          <p:nvPr/>
+        </p:nvCxnSpPr>
+        <p:spPr>
+          <a:xfrm>
+            <a:off x="8122723" y="3565567"/>
+            <a:ext cx="623455" cy="5938"/>
+          </a:xfrm>
+          <a:prstGeom prst="straightConnector1">
+            <a:avLst/>
+          </a:prstGeom>
+          <a:ln w="19050">
+            <a:headEnd type="triangle"/>
+            <a:tailEnd type="triangle"/>
+          </a:ln>
+        </p:spPr>
+        <p:style>
+          <a:lnRef idx="1">
+            <a:schemeClr val="accent1"/>
+          </a:lnRef>
+          <a:fillRef idx="0">
+            <a:schemeClr val="accent1"/>
+          </a:fillRef>
+          <a:effectRef idx="0">
+            <a:schemeClr val="accent1"/>
+          </a:effectRef>
+          <a:fontRef idx="minor">
+            <a:schemeClr val="tx1"/>
+          </a:fontRef>
+        </p:style>
+      </p:cxnSp>
+      <p:sp>
+        <p:nvSpPr>
+          <p:cNvPr id="18" name="사각형: 둥근 모서리 17">
+            <a:extLst>
+              <a:ext uri="{FF2B5EF4-FFF2-40B4-BE49-F238E27FC236}">
+                <a16:creationId xmlns:a16="http://schemas.microsoft.com/office/drawing/2014/main" id="{043700B2-6094-C5C4-D57F-B9121D308454}"/>
+              </a:ext>
+            </a:extLst>
+          </p:cNvPr>
+          <p:cNvSpPr/>
+          <p:nvPr/>
+        </p:nvSpPr>
+        <p:spPr>
+          <a:xfrm>
+            <a:off x="4589813" y="2395846"/>
+            <a:ext cx="688769" cy="581891"/>
+          </a:xfrm>
+          <a:prstGeom prst="roundRect">
+            <a:avLst/>
+          </a:prstGeom>
+        </p:spPr>
+        <p:style>
+          <a:lnRef idx="2">
+            <a:schemeClr val="accent4">
+              <a:shade val="15000"/>
+            </a:schemeClr>
+          </a:lnRef>
+          <a:fillRef idx="1">
+            <a:schemeClr val="accent4"/>
+          </a:fillRef>
+          <a:effectRef idx="0">
+            <a:schemeClr val="accent4"/>
+          </a:effectRef>
+          <a:fontRef idx="minor">
+            <a:schemeClr val="lt1"/>
+          </a:fontRef>
+        </p:style>
+        <p:txBody>
+          <a:bodyPr rtlCol="0" anchor="ctr"/>
+          <a:lstStyle/>
+          <a:p>
+            <a:pPr algn="ctr"/>
+            <a:r>
+              <a:rPr lang="en-US" altLang="ko-KR" dirty="0"/>
+              <a:t>UIG</a:t>
+            </a:r>
+            <a:endParaRPr lang="ko-KR" altLang="en-US" dirty="0"/>
+          </a:p>
+        </p:txBody>
+      </p:sp>
+      <p:sp>
+        <p:nvSpPr>
+          <p:cNvPr id="19" name="사각형: 둥근 모서리 18">
+            <a:extLst>
+              <a:ext uri="{FF2B5EF4-FFF2-40B4-BE49-F238E27FC236}">
+                <a16:creationId xmlns:a16="http://schemas.microsoft.com/office/drawing/2014/main" id="{D9B9A9FF-001F-DDD9-24C2-8B01DB9DF7B9}"/>
+              </a:ext>
+            </a:extLst>
+          </p:cNvPr>
+          <p:cNvSpPr/>
+          <p:nvPr/>
+        </p:nvSpPr>
+        <p:spPr>
+          <a:xfrm>
+            <a:off x="1484416" y="2413660"/>
+            <a:ext cx="688769" cy="581891"/>
+          </a:xfrm>
+          <a:prstGeom prst="roundRect">
+            <a:avLst/>
+          </a:prstGeom>
+        </p:spPr>
+        <p:style>
+          <a:lnRef idx="2">
+            <a:schemeClr val="accent6">
+              <a:shade val="15000"/>
+            </a:schemeClr>
+          </a:lnRef>
+          <a:fillRef idx="1">
+            <a:schemeClr val="accent6"/>
+          </a:fillRef>
+          <a:effectRef idx="0">
+            <a:schemeClr val="accent6"/>
+          </a:effectRef>
+          <a:fontRef idx="minor">
+            <a:schemeClr val="lt1"/>
+          </a:fontRef>
+        </p:style>
+        <p:txBody>
+          <a:bodyPr rtlCol="0" anchor="ctr"/>
+          <a:lstStyle/>
+          <a:p>
+            <a:pPr algn="ctr"/>
+            <a:r>
+              <a:rPr lang="en-US" altLang="ko-KR" dirty="0"/>
+              <a:t>UIG</a:t>
+            </a:r>
+            <a:endParaRPr lang="ko-KR" altLang="en-US" dirty="0"/>
+          </a:p>
+        </p:txBody>
+      </p:sp>
+      <p:sp>
+        <p:nvSpPr>
+          <p:cNvPr id="20" name="사각형: 둥근 모서리 19">
+            <a:extLst>
+              <a:ext uri="{FF2B5EF4-FFF2-40B4-BE49-F238E27FC236}">
+                <a16:creationId xmlns:a16="http://schemas.microsoft.com/office/drawing/2014/main" id="{2831A5E4-D59B-97FB-03EF-96245E3B5985}"/>
+              </a:ext>
+            </a:extLst>
+          </p:cNvPr>
+          <p:cNvSpPr/>
+          <p:nvPr/>
+        </p:nvSpPr>
+        <p:spPr>
+          <a:xfrm>
+            <a:off x="4096987" y="4177145"/>
+            <a:ext cx="1650670" cy="667989"/>
+          </a:xfrm>
+          <a:prstGeom prst="roundRect">
+            <a:avLst/>
+          </a:prstGeom>
+        </p:spPr>
+        <p:style>
+          <a:lnRef idx="2">
+            <a:schemeClr val="accent2">
+              <a:shade val="15000"/>
+            </a:schemeClr>
+          </a:lnRef>
+          <a:fillRef idx="1">
+            <a:schemeClr val="accent2"/>
+          </a:fillRef>
+          <a:effectRef idx="0">
+            <a:schemeClr val="accent2"/>
+          </a:effectRef>
+          <a:fontRef idx="minor">
+            <a:schemeClr val="lt1"/>
+          </a:fontRef>
+        </p:style>
+        <p:txBody>
+          <a:bodyPr rtlCol="0" anchor="ctr"/>
+          <a:lstStyle/>
+          <a:p>
+            <a:pPr algn="ctr"/>
+            <a:r>
+              <a:rPr lang="en-US" altLang="ko-KR" dirty="0"/>
+              <a:t>Map</a:t>
+            </a:r>
+          </a:p>
+          <a:p>
+            <a:pPr algn="ctr"/>
+            <a:r>
+              <a:rPr lang="en-US" altLang="ko-KR" dirty="0"/>
+              <a:t>&lt;key, value&gt;</a:t>
+            </a:r>
+            <a:endParaRPr lang="ko-KR" altLang="en-US" dirty="0"/>
+          </a:p>
+        </p:txBody>
+      </p:sp>
+      <p:sp>
+        <p:nvSpPr>
+          <p:cNvPr id="21" name="사각형: 둥근 모서리 20">
+            <a:extLst>
+              <a:ext uri="{FF2B5EF4-FFF2-40B4-BE49-F238E27FC236}">
+                <a16:creationId xmlns:a16="http://schemas.microsoft.com/office/drawing/2014/main" id="{10DB0E15-F5AF-AA0D-6E21-6FAA4D478804}"/>
+              </a:ext>
+            </a:extLst>
+          </p:cNvPr>
+          <p:cNvSpPr/>
+          <p:nvPr/>
+        </p:nvSpPr>
+        <p:spPr>
+          <a:xfrm>
+            <a:off x="6501740" y="4153394"/>
+            <a:ext cx="1662546" cy="685802"/>
+          </a:xfrm>
+          <a:prstGeom prst="roundRect">
+            <a:avLst/>
+          </a:prstGeom>
+        </p:spPr>
+        <p:style>
+          <a:lnRef idx="2">
+            <a:schemeClr val="accent2">
+              <a:shade val="15000"/>
+            </a:schemeClr>
+          </a:lnRef>
+          <a:fillRef idx="1">
+            <a:schemeClr val="accent2"/>
+          </a:fillRef>
+          <a:effectRef idx="0">
+            <a:schemeClr val="accent2"/>
+          </a:effectRef>
+          <a:fontRef idx="minor">
+            <a:schemeClr val="lt1"/>
+          </a:fontRef>
+        </p:style>
+        <p:txBody>
+          <a:bodyPr rtlCol="0" anchor="ctr"/>
+          <a:lstStyle/>
+          <a:p>
+            <a:pPr algn="ctr"/>
+            <a:r>
+              <a:rPr lang="en-US" altLang="ko-KR" dirty="0"/>
+              <a:t>Map</a:t>
+            </a:r>
+          </a:p>
+          <a:p>
+            <a:pPr algn="ctr"/>
+            <a:r>
+              <a:rPr lang="en-US" altLang="ko-KR" dirty="0"/>
+              <a:t>&lt;key, value&gt;</a:t>
+            </a:r>
+            <a:endParaRPr lang="ko-KR" altLang="en-US" dirty="0"/>
+          </a:p>
+        </p:txBody>
+      </p:sp>
+      <p:sp>
+        <p:nvSpPr>
+          <p:cNvPr id="22" name="사각형: 둥근 모서리 21">
+            <a:extLst>
+              <a:ext uri="{FF2B5EF4-FFF2-40B4-BE49-F238E27FC236}">
+                <a16:creationId xmlns:a16="http://schemas.microsoft.com/office/drawing/2014/main" id="{EA56AB58-D2DE-01FD-271B-752663D1AAAC}"/>
+              </a:ext>
+            </a:extLst>
+          </p:cNvPr>
+          <p:cNvSpPr/>
+          <p:nvPr/>
+        </p:nvSpPr>
+        <p:spPr>
+          <a:xfrm>
+            <a:off x="1033152" y="4013861"/>
+            <a:ext cx="1757550" cy="688769"/>
+          </a:xfrm>
+          <a:prstGeom prst="roundRect">
+            <a:avLst/>
+          </a:prstGeom>
+        </p:spPr>
+        <p:style>
+          <a:lnRef idx="2">
+            <a:schemeClr val="accent2">
+              <a:shade val="15000"/>
+            </a:schemeClr>
+          </a:lnRef>
+          <a:fillRef idx="1">
+            <a:schemeClr val="accent2"/>
+          </a:fillRef>
+          <a:effectRef idx="0">
+            <a:schemeClr val="accent2"/>
+          </a:effectRef>
+          <a:fontRef idx="minor">
+            <a:schemeClr val="lt1"/>
+          </a:fontRef>
+        </p:style>
+        <p:txBody>
+          <a:bodyPr rtlCol="0" anchor="ctr"/>
+          <a:lstStyle/>
+          <a:p>
+            <a:pPr algn="ctr"/>
+            <a:r>
+              <a:rPr lang="en-US" altLang="ko-KR" dirty="0"/>
+              <a:t>Map</a:t>
+            </a:r>
+          </a:p>
+          <a:p>
+            <a:pPr algn="ctr"/>
+            <a:r>
+              <a:rPr lang="en-US" altLang="ko-KR" dirty="0"/>
+              <a:t>&lt;key, value&gt;</a:t>
+            </a:r>
+            <a:endParaRPr lang="ko-KR" altLang="en-US" dirty="0"/>
+          </a:p>
+        </p:txBody>
+      </p:sp>
+    </p:spTree>
+    <p:extLst>
+      <p:ext uri="{BB962C8B-B14F-4D97-AF65-F5344CB8AC3E}">
+        <p14:creationId xmlns:p14="http://schemas.microsoft.com/office/powerpoint/2010/main" val="2047931937"/>
+      </p:ext>
+    </p:extLst>
+  </p:cSld>
+  <p:clrMapOvr>
+    <a:masterClrMapping/>
+  </p:clrMapOvr>
+</p:sld>
+</file>
+
+<file path=ppt/slides/slide14.xml><?xml version="1.0" encoding="utf-8"?>
+<p:sld xmlns:a="http://schemas.openxmlformats.org/drawingml/2006/main" xmlns:r="http://schemas.openxmlformats.org/officeDocument/2006/relationships" xmlns:p="http://schemas.openxmlformats.org/presentationml/2006/main">
+  <p:cSld>
+    <p:spTree>
+      <p:nvGrpSpPr>
+        <p:cNvPr id="1" name="">
+          <a:extLst>
+            <a:ext uri="{FF2B5EF4-FFF2-40B4-BE49-F238E27FC236}">
+              <a16:creationId xmlns:a16="http://schemas.microsoft.com/office/drawing/2014/main" id="{EDA99006-1ED7-6210-FB6F-D1F8757D9D2C}"/>
+            </a:ext>
+          </a:extLst>
+        </p:cNvPr>
+        <p:cNvGrpSpPr/>
+        <p:nvPr/>
+      </p:nvGrpSpPr>
+      <p:grpSpPr>
+        <a:xfrm>
+          <a:off x="0" y="0"/>
+          <a:ext cx="0" cy="0"/>
+          <a:chOff x="0" y="0"/>
+          <a:chExt cx="0" cy="0"/>
+        </a:xfrm>
+      </p:grpSpPr>
+      <p:sp>
+        <p:nvSpPr>
+          <p:cNvPr id="4" name="타원 3">
+            <a:extLst>
+              <a:ext uri="{FF2B5EF4-FFF2-40B4-BE49-F238E27FC236}">
+                <a16:creationId xmlns:a16="http://schemas.microsoft.com/office/drawing/2014/main" id="{47170DDA-DB89-A234-154C-051D2348A722}"/>
+              </a:ext>
+            </a:extLst>
+          </p:cNvPr>
+          <p:cNvSpPr/>
+          <p:nvPr/>
+        </p:nvSpPr>
+        <p:spPr>
+          <a:xfrm>
+            <a:off x="955689" y="1753096"/>
+            <a:ext cx="1579418" cy="1579418"/>
+          </a:xfrm>
+          <a:prstGeom prst="ellipse">
+            <a:avLst/>
+          </a:prstGeom>
+        </p:spPr>
+        <p:style>
+          <a:lnRef idx="2">
+            <a:schemeClr val="accent5">
+              <a:shade val="15000"/>
+            </a:schemeClr>
+          </a:lnRef>
+          <a:fillRef idx="1">
+            <a:schemeClr val="accent5"/>
+          </a:fillRef>
+          <a:effectRef idx="0">
+            <a:schemeClr val="accent5"/>
+          </a:effectRef>
+          <a:fontRef idx="minor">
+            <a:schemeClr val="lt1"/>
+          </a:fontRef>
+        </p:style>
+        <p:txBody>
+          <a:bodyPr rtlCol="0" anchor="ctr"/>
+          <a:lstStyle/>
+          <a:p>
+            <a:pPr algn="ctr"/>
+            <a:r>
+              <a:rPr lang="en-US" altLang="ko-KR" dirty="0"/>
+              <a:t>Client</a:t>
+            </a:r>
+          </a:p>
+          <a:p>
+            <a:pPr algn="ctr"/>
+            <a:r>
+              <a:rPr lang="en-US" altLang="ko-KR" dirty="0"/>
+              <a:t>interface</a:t>
+            </a:r>
+            <a:endParaRPr lang="ko-KR" altLang="en-US" dirty="0"/>
+          </a:p>
+        </p:txBody>
+      </p:sp>
+      <p:sp>
+        <p:nvSpPr>
+          <p:cNvPr id="5" name="타원 4">
+            <a:extLst>
+              <a:ext uri="{FF2B5EF4-FFF2-40B4-BE49-F238E27FC236}">
+                <a16:creationId xmlns:a16="http://schemas.microsoft.com/office/drawing/2014/main" id="{89B06098-FDBA-528A-1885-E282250F069B}"/>
+              </a:ext>
+            </a:extLst>
+          </p:cNvPr>
+          <p:cNvSpPr/>
+          <p:nvPr/>
+        </p:nvSpPr>
+        <p:spPr>
+          <a:xfrm>
+            <a:off x="4206805" y="1715707"/>
+            <a:ext cx="1656607" cy="1656607"/>
+          </a:xfrm>
+          <a:prstGeom prst="ellipse">
+            <a:avLst/>
+          </a:prstGeom>
+        </p:spPr>
+        <p:style>
+          <a:lnRef idx="2">
+            <a:schemeClr val="accent5">
+              <a:shade val="15000"/>
+            </a:schemeClr>
+          </a:lnRef>
+          <a:fillRef idx="1">
+            <a:schemeClr val="accent5"/>
+          </a:fillRef>
+          <a:effectRef idx="0">
+            <a:schemeClr val="accent5"/>
+          </a:effectRef>
+          <a:fontRef idx="minor">
+            <a:schemeClr val="lt1"/>
+          </a:fontRef>
+        </p:style>
+        <p:txBody>
+          <a:bodyPr rtlCol="0" anchor="ctr"/>
+          <a:lstStyle/>
+          <a:p>
+            <a:pPr algn="ctr"/>
+            <a:r>
+              <a:rPr lang="en-US" altLang="ko-KR" dirty="0"/>
+              <a:t>frontend</a:t>
+            </a:r>
+            <a:endParaRPr lang="ko-KR" altLang="en-US" dirty="0"/>
+          </a:p>
+        </p:txBody>
+      </p:sp>
+      <p:sp>
+        <p:nvSpPr>
+          <p:cNvPr id="6" name="사각형: 둥근 모서리 5">
+            <a:extLst>
+              <a:ext uri="{FF2B5EF4-FFF2-40B4-BE49-F238E27FC236}">
+                <a16:creationId xmlns:a16="http://schemas.microsoft.com/office/drawing/2014/main" id="{AF65F67C-BB8B-7AC7-0417-66175361248F}"/>
+              </a:ext>
+            </a:extLst>
+          </p:cNvPr>
+          <p:cNvSpPr/>
+          <p:nvPr/>
+        </p:nvSpPr>
+        <p:spPr>
+          <a:xfrm>
+            <a:off x="3739707" y="842872"/>
+            <a:ext cx="7243948" cy="3218213"/>
+          </a:xfrm>
+          <a:prstGeom prst="roundRect">
+            <a:avLst/>
+          </a:prstGeom>
+          <a:noFill/>
+        </p:spPr>
+        <p:style>
+          <a:lnRef idx="2">
+            <a:schemeClr val="accent1">
+              <a:shade val="15000"/>
+            </a:schemeClr>
+          </a:lnRef>
+          <a:fillRef idx="1">
+            <a:schemeClr val="accent1"/>
+          </a:fillRef>
+          <a:effectRef idx="0">
+            <a:schemeClr val="accent1"/>
+          </a:effectRef>
+          <a:fontRef idx="minor">
+            <a:schemeClr val="lt1"/>
+          </a:fontRef>
+        </p:style>
+        <p:txBody>
+          <a:bodyPr rtlCol="0" anchor="ctr"/>
+          <a:lstStyle/>
+          <a:p>
+            <a:pPr algn="ctr"/>
+            <a:endParaRPr lang="ko-KR" altLang="en-US"/>
+          </a:p>
+        </p:txBody>
+      </p:sp>
+      <p:sp>
+        <p:nvSpPr>
+          <p:cNvPr id="7" name="타원 6">
+            <a:extLst>
+              <a:ext uri="{FF2B5EF4-FFF2-40B4-BE49-F238E27FC236}">
+                <a16:creationId xmlns:a16="http://schemas.microsoft.com/office/drawing/2014/main" id="{2D94EB55-7126-98A5-9E40-34A5E0DE2A58}"/>
+              </a:ext>
+            </a:extLst>
+          </p:cNvPr>
+          <p:cNvSpPr/>
+          <p:nvPr/>
+        </p:nvSpPr>
+        <p:spPr>
+          <a:xfrm>
+            <a:off x="6530410" y="1715707"/>
+            <a:ext cx="1656607" cy="1656607"/>
+          </a:xfrm>
+          <a:prstGeom prst="ellipse">
+            <a:avLst/>
+          </a:prstGeom>
+        </p:spPr>
+        <p:style>
+          <a:lnRef idx="2">
+            <a:schemeClr val="accent5">
+              <a:shade val="15000"/>
+            </a:schemeClr>
+          </a:lnRef>
+          <a:fillRef idx="1">
+            <a:schemeClr val="accent5"/>
+          </a:fillRef>
+          <a:effectRef idx="0">
+            <a:schemeClr val="accent5"/>
+          </a:effectRef>
+          <a:fontRef idx="minor">
+            <a:schemeClr val="lt1"/>
+          </a:fontRef>
+        </p:style>
+        <p:txBody>
+          <a:bodyPr rtlCol="0" anchor="ctr"/>
+          <a:lstStyle/>
+          <a:p>
+            <a:pPr algn="ctr"/>
+            <a:r>
+              <a:rPr lang="en-US" altLang="ko-KR" dirty="0"/>
+              <a:t>backend</a:t>
+            </a:r>
+            <a:endParaRPr lang="ko-KR" altLang="en-US" dirty="0"/>
+          </a:p>
+        </p:txBody>
+      </p:sp>
+      <p:sp>
+        <p:nvSpPr>
+          <p:cNvPr id="8" name="타원 7">
+            <a:extLst>
+              <a:ext uri="{FF2B5EF4-FFF2-40B4-BE49-F238E27FC236}">
+                <a16:creationId xmlns:a16="http://schemas.microsoft.com/office/drawing/2014/main" id="{4144D7DC-59C6-1AE0-A918-B998B4AD0008}"/>
+              </a:ext>
+            </a:extLst>
+          </p:cNvPr>
+          <p:cNvSpPr/>
+          <p:nvPr/>
+        </p:nvSpPr>
+        <p:spPr>
+          <a:xfrm>
+            <a:off x="8810472" y="1721645"/>
+            <a:ext cx="1656607" cy="1656607"/>
+          </a:xfrm>
+          <a:prstGeom prst="ellipse">
+            <a:avLst/>
+          </a:prstGeom>
+        </p:spPr>
+        <p:style>
+          <a:lnRef idx="2">
+            <a:schemeClr val="accent5">
+              <a:shade val="15000"/>
+            </a:schemeClr>
+          </a:lnRef>
+          <a:fillRef idx="1">
+            <a:schemeClr val="accent5"/>
+          </a:fillRef>
+          <a:effectRef idx="0">
+            <a:schemeClr val="accent5"/>
+          </a:effectRef>
+          <a:fontRef idx="minor">
+            <a:schemeClr val="lt1"/>
+          </a:fontRef>
+        </p:style>
+        <p:txBody>
+          <a:bodyPr rtlCol="0" anchor="ctr"/>
+          <a:lstStyle/>
+          <a:p>
+            <a:pPr algn="ctr"/>
+            <a:r>
+              <a:rPr lang="en-US" altLang="ko-KR" dirty="0"/>
+              <a:t>DB</a:t>
+            </a:r>
+            <a:endParaRPr lang="ko-KR" altLang="en-US" dirty="0"/>
+          </a:p>
+        </p:txBody>
+      </p:sp>
+      <p:cxnSp>
+        <p:nvCxnSpPr>
+          <p:cNvPr id="10" name="직선 화살표 연결선 9">
+            <a:extLst>
+              <a:ext uri="{FF2B5EF4-FFF2-40B4-BE49-F238E27FC236}">
+                <a16:creationId xmlns:a16="http://schemas.microsoft.com/office/drawing/2014/main" id="{571FF083-0819-1678-A017-C2D737EAC5AC}"/>
+              </a:ext>
+            </a:extLst>
+          </p:cNvPr>
+          <p:cNvCxnSpPr>
+            <a:cxnSpLocks/>
+          </p:cNvCxnSpPr>
+          <p:nvPr/>
+        </p:nvCxnSpPr>
+        <p:spPr>
+          <a:xfrm flipV="1">
+            <a:off x="2620831" y="2401506"/>
+            <a:ext cx="1500249" cy="5938"/>
+          </a:xfrm>
+          <a:prstGeom prst="straightConnector1">
+            <a:avLst/>
+          </a:prstGeom>
+          <a:ln w="19050">
+            <a:solidFill>
+              <a:srgbClr val="00B0F0"/>
+            </a:solidFill>
+            <a:headEnd type="none"/>
+            <a:tailEnd type="triangle"/>
+          </a:ln>
+        </p:spPr>
+        <p:style>
+          <a:lnRef idx="1">
+            <a:schemeClr val="accent1"/>
+          </a:lnRef>
+          <a:fillRef idx="0">
+            <a:schemeClr val="accent1"/>
+          </a:fillRef>
+          <a:effectRef idx="0">
+            <a:schemeClr val="accent1"/>
+          </a:effectRef>
+          <a:fontRef idx="minor">
+            <a:schemeClr val="tx1"/>
+          </a:fontRef>
+        </p:style>
+      </p:cxnSp>
+      <p:cxnSp>
+        <p:nvCxnSpPr>
+          <p:cNvPr id="11" name="직선 화살표 연결선 10">
+            <a:extLst>
+              <a:ext uri="{FF2B5EF4-FFF2-40B4-BE49-F238E27FC236}">
+                <a16:creationId xmlns:a16="http://schemas.microsoft.com/office/drawing/2014/main" id="{90CAB9AD-8C15-C996-0045-681F8BF0D07D}"/>
+              </a:ext>
+            </a:extLst>
+          </p:cNvPr>
+          <p:cNvCxnSpPr>
+            <a:cxnSpLocks/>
+          </p:cNvCxnSpPr>
+          <p:nvPr/>
+        </p:nvCxnSpPr>
+        <p:spPr>
+          <a:xfrm>
+            <a:off x="5891089" y="2415423"/>
+            <a:ext cx="666998" cy="0"/>
+          </a:xfrm>
+          <a:prstGeom prst="straightConnector1">
+            <a:avLst/>
+          </a:prstGeom>
+          <a:ln w="19050">
+            <a:solidFill>
+              <a:srgbClr val="C00000"/>
+            </a:solidFill>
+            <a:headEnd type="none"/>
+            <a:tailEnd type="triangle"/>
+          </a:ln>
+        </p:spPr>
+        <p:style>
+          <a:lnRef idx="1">
+            <a:schemeClr val="accent1"/>
+          </a:lnRef>
+          <a:fillRef idx="0">
+            <a:schemeClr val="accent1"/>
+          </a:fillRef>
+          <a:effectRef idx="0">
+            <a:schemeClr val="accent1"/>
+          </a:effectRef>
+          <a:fontRef idx="minor">
+            <a:schemeClr val="tx1"/>
+          </a:fontRef>
+        </p:style>
+      </p:cxnSp>
+      <p:cxnSp>
+        <p:nvCxnSpPr>
+          <p:cNvPr id="15" name="직선 화살표 연결선 14">
+            <a:extLst>
+              <a:ext uri="{FF2B5EF4-FFF2-40B4-BE49-F238E27FC236}">
+                <a16:creationId xmlns:a16="http://schemas.microsoft.com/office/drawing/2014/main" id="{3A546D0D-F439-D315-E8CF-56AB2EA40ACD}"/>
+              </a:ext>
+            </a:extLst>
+          </p:cNvPr>
+          <p:cNvCxnSpPr>
+            <a:cxnSpLocks/>
+            <a:stCxn id="7" idx="6"/>
+            <a:endCxn id="8" idx="2"/>
+          </p:cNvCxnSpPr>
+          <p:nvPr/>
+        </p:nvCxnSpPr>
+        <p:spPr>
+          <a:xfrm>
+            <a:off x="8187017" y="2544011"/>
+            <a:ext cx="623455" cy="5938"/>
+          </a:xfrm>
+          <a:prstGeom prst="straightConnector1">
+            <a:avLst/>
+          </a:prstGeom>
+          <a:ln w="19050">
+            <a:headEnd type="triangle"/>
+            <a:tailEnd type="triangle"/>
+          </a:ln>
+        </p:spPr>
+        <p:style>
+          <a:lnRef idx="1">
+            <a:schemeClr val="accent1"/>
+          </a:lnRef>
+          <a:fillRef idx="0">
+            <a:schemeClr val="accent1"/>
+          </a:fillRef>
+          <a:effectRef idx="0">
+            <a:schemeClr val="accent1"/>
+          </a:effectRef>
+          <a:fontRef idx="minor">
+            <a:schemeClr val="tx1"/>
+          </a:fontRef>
+        </p:style>
+      </p:cxnSp>
+      <p:sp>
+        <p:nvSpPr>
+          <p:cNvPr id="18" name="사각형: 둥근 모서리 17">
+            <a:extLst>
+              <a:ext uri="{FF2B5EF4-FFF2-40B4-BE49-F238E27FC236}">
+                <a16:creationId xmlns:a16="http://schemas.microsoft.com/office/drawing/2014/main" id="{FCE5422F-33E7-61A5-29CC-6587E3699624}"/>
+              </a:ext>
+            </a:extLst>
+          </p:cNvPr>
+          <p:cNvSpPr/>
+          <p:nvPr/>
+        </p:nvSpPr>
+        <p:spPr>
+          <a:xfrm>
+            <a:off x="9287771" y="1389134"/>
+            <a:ext cx="688769" cy="581891"/>
+          </a:xfrm>
+          <a:prstGeom prst="roundRect">
+            <a:avLst/>
+          </a:prstGeom>
+        </p:spPr>
+        <p:style>
+          <a:lnRef idx="2">
+            <a:schemeClr val="accent4">
+              <a:shade val="15000"/>
+            </a:schemeClr>
+          </a:lnRef>
+          <a:fillRef idx="1">
+            <a:schemeClr val="accent4"/>
+          </a:fillRef>
+          <a:effectRef idx="0">
+            <a:schemeClr val="accent4"/>
+          </a:effectRef>
+          <a:fontRef idx="minor">
+            <a:schemeClr val="lt1"/>
+          </a:fontRef>
+        </p:style>
+        <p:txBody>
+          <a:bodyPr rtlCol="0" anchor="ctr"/>
+          <a:lstStyle/>
+          <a:p>
+            <a:pPr algn="ctr"/>
+            <a:r>
+              <a:rPr lang="en-US" altLang="ko-KR" dirty="0"/>
+              <a:t>UIG</a:t>
+            </a:r>
+            <a:endParaRPr lang="ko-KR" altLang="en-US" dirty="0"/>
+          </a:p>
+        </p:txBody>
+      </p:sp>
+      <p:cxnSp>
+        <p:nvCxnSpPr>
+          <p:cNvPr id="2" name="직선 화살표 연결선 1">
+            <a:extLst>
+              <a:ext uri="{FF2B5EF4-FFF2-40B4-BE49-F238E27FC236}">
+                <a16:creationId xmlns:a16="http://schemas.microsoft.com/office/drawing/2014/main" id="{A6326806-B2E7-CCE9-9207-72A2CE2F7009}"/>
+              </a:ext>
+            </a:extLst>
+          </p:cNvPr>
+          <p:cNvCxnSpPr>
+            <a:cxnSpLocks/>
+          </p:cNvCxnSpPr>
+          <p:nvPr/>
+        </p:nvCxnSpPr>
+        <p:spPr>
+          <a:xfrm flipH="1">
+            <a:off x="2592317" y="2671393"/>
+            <a:ext cx="1558202" cy="0"/>
+          </a:xfrm>
+          <a:prstGeom prst="straightConnector1">
+            <a:avLst/>
+          </a:prstGeom>
+          <a:ln w="19050">
+            <a:solidFill>
+              <a:srgbClr val="00B0F0"/>
+            </a:solidFill>
+            <a:headEnd type="none"/>
+            <a:tailEnd type="triangle"/>
+          </a:ln>
+        </p:spPr>
+        <p:style>
+          <a:lnRef idx="1">
+            <a:schemeClr val="accent1"/>
+          </a:lnRef>
+          <a:fillRef idx="0">
+            <a:schemeClr val="accent1"/>
+          </a:fillRef>
+          <a:effectRef idx="0">
+            <a:schemeClr val="accent1"/>
+          </a:effectRef>
+          <a:fontRef idx="minor">
+            <a:schemeClr val="tx1"/>
+          </a:fontRef>
+        </p:style>
+      </p:cxnSp>
+      <p:cxnSp>
+        <p:nvCxnSpPr>
+          <p:cNvPr id="9" name="직선 화살표 연결선 8">
+            <a:extLst>
+              <a:ext uri="{FF2B5EF4-FFF2-40B4-BE49-F238E27FC236}">
+                <a16:creationId xmlns:a16="http://schemas.microsoft.com/office/drawing/2014/main" id="{21BE3F8F-5941-C8BE-91FD-6AD5BF194416}"/>
+              </a:ext>
+            </a:extLst>
+          </p:cNvPr>
+          <p:cNvCxnSpPr>
+            <a:cxnSpLocks/>
+          </p:cNvCxnSpPr>
+          <p:nvPr/>
+        </p:nvCxnSpPr>
+        <p:spPr>
+          <a:xfrm flipH="1">
+            <a:off x="5857999" y="2729748"/>
+            <a:ext cx="721395" cy="0"/>
+          </a:xfrm>
+          <a:prstGeom prst="straightConnector1">
+            <a:avLst/>
+          </a:prstGeom>
+          <a:ln w="19050">
+            <a:solidFill>
+              <a:srgbClr val="C00000"/>
+            </a:solidFill>
+            <a:headEnd type="none"/>
+            <a:tailEnd type="triangle"/>
+          </a:ln>
+        </p:spPr>
+        <p:style>
+          <a:lnRef idx="1">
+            <a:schemeClr val="accent1"/>
+          </a:lnRef>
+          <a:fillRef idx="0">
+            <a:schemeClr val="accent1"/>
+          </a:fillRef>
+          <a:effectRef idx="0">
+            <a:schemeClr val="accent1"/>
+          </a:effectRef>
+          <a:fontRef idx="minor">
+            <a:schemeClr val="tx1"/>
+          </a:fontRef>
+        </p:style>
+      </p:cxnSp>
+      <p:sp>
+        <p:nvSpPr>
+          <p:cNvPr id="14" name="사각형: 둥근 모서리 13">
+            <a:extLst>
+              <a:ext uri="{FF2B5EF4-FFF2-40B4-BE49-F238E27FC236}">
+                <a16:creationId xmlns:a16="http://schemas.microsoft.com/office/drawing/2014/main" id="{ED965E50-C7CC-1975-E96A-A036317C0688}"/>
+              </a:ext>
+            </a:extLst>
+          </p:cNvPr>
+          <p:cNvSpPr/>
+          <p:nvPr/>
+        </p:nvSpPr>
+        <p:spPr>
+          <a:xfrm>
+            <a:off x="7394678" y="1353414"/>
+            <a:ext cx="688769" cy="581891"/>
+          </a:xfrm>
+          <a:prstGeom prst="roundRect">
+            <a:avLst/>
+          </a:prstGeom>
+        </p:spPr>
+        <p:style>
+          <a:lnRef idx="2">
+            <a:schemeClr val="accent2">
+              <a:shade val="15000"/>
+            </a:schemeClr>
+          </a:lnRef>
+          <a:fillRef idx="1">
+            <a:schemeClr val="accent2"/>
+          </a:fillRef>
+          <a:effectRef idx="0">
+            <a:schemeClr val="accent2"/>
+          </a:effectRef>
+          <a:fontRef idx="minor">
+            <a:schemeClr val="lt1"/>
+          </a:fontRef>
+        </p:style>
+        <p:txBody>
+          <a:bodyPr rtlCol="0" anchor="ctr"/>
+          <a:lstStyle/>
+          <a:p>
+            <a:pPr algn="ctr"/>
+            <a:r>
+              <a:rPr lang="en-US" altLang="ko-KR" dirty="0"/>
+              <a:t>UIG</a:t>
+            </a:r>
+            <a:endParaRPr lang="ko-KR" altLang="en-US" dirty="0"/>
+          </a:p>
+        </p:txBody>
+      </p:sp>
+      <p:sp>
+        <p:nvSpPr>
+          <p:cNvPr id="17" name="타원 16">
+            <a:extLst>
+              <a:ext uri="{FF2B5EF4-FFF2-40B4-BE49-F238E27FC236}">
+                <a16:creationId xmlns:a16="http://schemas.microsoft.com/office/drawing/2014/main" id="{58506F51-CACC-1FBE-CAB2-1F4B64793F50}"/>
+              </a:ext>
+            </a:extLst>
+          </p:cNvPr>
+          <p:cNvSpPr/>
+          <p:nvPr/>
+        </p:nvSpPr>
+        <p:spPr>
+          <a:xfrm>
+            <a:off x="6460179" y="4179837"/>
+            <a:ext cx="1656607" cy="1656607"/>
+          </a:xfrm>
+          <a:prstGeom prst="ellipse">
+            <a:avLst/>
+          </a:prstGeom>
+        </p:spPr>
+        <p:style>
+          <a:lnRef idx="2">
+            <a:schemeClr val="accent5">
+              <a:shade val="15000"/>
+            </a:schemeClr>
+          </a:lnRef>
+          <a:fillRef idx="1">
+            <a:schemeClr val="accent5"/>
+          </a:fillRef>
+          <a:effectRef idx="0">
+            <a:schemeClr val="accent5"/>
+          </a:effectRef>
+          <a:fontRef idx="minor">
+            <a:schemeClr val="lt1"/>
+          </a:fontRef>
+        </p:style>
+        <p:txBody>
+          <a:bodyPr rtlCol="0" anchor="ctr"/>
+          <a:lstStyle/>
+          <a:p>
+            <a:pPr algn="ctr"/>
+            <a:r>
+              <a:rPr lang="en-US" altLang="ko-KR" dirty="0"/>
+              <a:t>ticket</a:t>
+            </a:r>
+          </a:p>
+          <a:p>
+            <a:pPr algn="ctr"/>
+            <a:r>
+              <a:rPr lang="en-US" altLang="ko-KR" dirty="0"/>
+              <a:t>server</a:t>
+            </a:r>
+            <a:endParaRPr lang="ko-KR" altLang="en-US" dirty="0"/>
+          </a:p>
+        </p:txBody>
+      </p:sp>
+      <p:sp>
+        <p:nvSpPr>
+          <p:cNvPr id="23" name="사각형: 둥근 모서리 22">
+            <a:extLst>
+              <a:ext uri="{FF2B5EF4-FFF2-40B4-BE49-F238E27FC236}">
+                <a16:creationId xmlns:a16="http://schemas.microsoft.com/office/drawing/2014/main" id="{BC8BA4D1-8C19-A7E8-B610-72757EAFF3DB}"/>
+              </a:ext>
+            </a:extLst>
+          </p:cNvPr>
+          <p:cNvSpPr/>
+          <p:nvPr/>
+        </p:nvSpPr>
+        <p:spPr>
+          <a:xfrm>
+            <a:off x="6437416" y="1474857"/>
+            <a:ext cx="688769" cy="581891"/>
+          </a:xfrm>
+          <a:prstGeom prst="roundRect">
+            <a:avLst/>
+          </a:prstGeom>
+        </p:spPr>
+        <p:style>
+          <a:lnRef idx="2">
+            <a:schemeClr val="accent6">
+              <a:shade val="15000"/>
+            </a:schemeClr>
+          </a:lnRef>
+          <a:fillRef idx="1">
+            <a:schemeClr val="accent6"/>
+          </a:fillRef>
+          <a:effectRef idx="0">
+            <a:schemeClr val="accent6"/>
+          </a:effectRef>
+          <a:fontRef idx="minor">
+            <a:schemeClr val="lt1"/>
+          </a:fontRef>
+        </p:style>
+        <p:txBody>
+          <a:bodyPr rtlCol="0" anchor="ctr"/>
+          <a:lstStyle/>
+          <a:p>
+            <a:pPr algn="ctr"/>
+            <a:r>
+              <a:rPr lang="en-US" altLang="ko-KR" dirty="0"/>
+              <a:t>UIG</a:t>
+            </a:r>
+            <a:endParaRPr lang="ko-KR" altLang="en-US" dirty="0"/>
+          </a:p>
+        </p:txBody>
+      </p:sp>
+    </p:spTree>
+    <p:extLst>
+      <p:ext uri="{BB962C8B-B14F-4D97-AF65-F5344CB8AC3E}">
+        <p14:creationId xmlns:p14="http://schemas.microsoft.com/office/powerpoint/2010/main" val="1025885506"/>
       </p:ext>
     </p:extLst>
   </p:cSld>
@@ -2454,56 +4144,62 @@
           <a:bodyPr/>
           <a:lstStyle/>
           <a:p>
-            <a:pPr algn="l"/>
-            <a:r>
-              <a:rPr lang="en-US" altLang="ko-KR" sz="1800" b="0" i="0" u="none" strike="noStrike" baseline="0" dirty="0">
-                <a:latin typeface="LiberationSerif"/>
-              </a:rPr>
-              <a:t>In this chapter, you are asked to design a unique ID generator in distributed systems.</a:t>
-            </a:r>
-          </a:p>
-          <a:p>
-            <a:pPr lvl="1"/>
-            <a:r>
-              <a:rPr lang="en-US" altLang="ko-KR" sz="1600" dirty="0">
+            <a:r>
+              <a:rPr lang="en-US" altLang="ko-KR" sz="1800" dirty="0">
                 <a:latin typeface="LiberationSerif"/>
               </a:rPr>
               <a:t>Your first thought might be to use a primary key with the </a:t>
             </a:r>
             <a:r>
-              <a:rPr lang="en-US" altLang="ko-KR" sz="1600" dirty="0" err="1">
+              <a:rPr lang="en-US" altLang="ko-KR" sz="1800" dirty="0" err="1">
                 <a:latin typeface="LiberationSerif"/>
               </a:rPr>
               <a:t>auto_increment</a:t>
             </a:r>
             <a:r>
-              <a:rPr lang="en-US" altLang="ko-KR" sz="1600" dirty="0">
+              <a:rPr lang="en-US" altLang="ko-KR" sz="1800" dirty="0">
                 <a:latin typeface="LiberationSerif"/>
               </a:rPr>
               <a:t> attribute in a traditional database.</a:t>
             </a:r>
           </a:p>
           <a:p>
-            <a:pPr lvl="1"/>
-            <a:r>
-              <a:rPr lang="en-US" altLang="ko-KR" sz="1600" dirty="0">
+            <a:r>
+              <a:rPr lang="en-US" altLang="ko-KR" sz="1800" b="1" dirty="0">
+                <a:solidFill>
+                  <a:srgbClr val="FF0000"/>
+                </a:solidFill>
                 <a:latin typeface="LiberationSerif"/>
               </a:rPr>
               <a:t>However, </a:t>
             </a:r>
             <a:r>
-              <a:rPr lang="en-US" altLang="ko-KR" sz="1600" b="1" dirty="0" err="1">
+              <a:rPr lang="en-US" altLang="ko-KR" sz="1800" b="1" dirty="0" err="1">
+                <a:solidFill>
+                  <a:srgbClr val="FF0000"/>
+                </a:solidFill>
                 <a:latin typeface="LiberationSerif"/>
               </a:rPr>
               <a:t>auto_increment</a:t>
             </a:r>
             <a:r>
-              <a:rPr lang="en-US" altLang="ko-KR" sz="1600" dirty="0">
-                <a:latin typeface="LiberationSerif"/>
-              </a:rPr>
-              <a:t> does not work in a distributed environment because a single database server is not large enough and generating unique IDs across multiple databases with minimal delay is challenging.</a:t>
-            </a:r>
-            <a:endParaRPr lang="ko-KR" altLang="en-US" sz="1600" dirty="0">
+              <a:rPr lang="en-US" altLang="ko-KR" sz="1800" b="1" dirty="0">
+                <a:solidFill>
+                  <a:srgbClr val="FF0000"/>
+                </a:solidFill>
+                <a:latin typeface="LiberationSerif"/>
+              </a:rPr>
+              <a:t> does not work in a distributed environment</a:t>
+            </a:r>
+          </a:p>
+          <a:p>
+            <a:r>
+              <a:rPr lang="en-US" altLang="ko-KR" sz="1800" dirty="0">
+                <a:latin typeface="LiberationSerif"/>
+              </a:rPr>
+              <a:t>because a single database server is not large enough and generating unique IDs across multiple databases with minimal delay is challenging.</a:t>
+            </a:r>
+            <a:endParaRPr lang="ko-KR" altLang="en-US" sz="1800" dirty="0">
               <a:latin typeface="LiberationSerif"/>
             </a:endParaRPr>
           </a:p>
@@ -3150,7 +4846,7 @@
               <a:rPr lang="en-US" altLang="ko-KR" sz="1800" dirty="0">
                 <a:latin typeface="LiberationSerif"/>
               </a:rPr>
-              <a:t> feature. Instead of increasing the next ID by 1, we increase it by k, where k is the number of database servers in use.</a:t>
+              <a:t> feature.</a:t>
             </a:r>
           </a:p>
           <a:p>
@@ -3158,6 +4854,14 @@
               <a:rPr lang="en-US" altLang="ko-KR" sz="1800" dirty="0">
                 <a:latin typeface="LiberationSerif"/>
               </a:rPr>
+              <a:t>Instead of increasing the next ID by 1, we increase it by k, where k is the number of database servers in use.</a:t>
+            </a:r>
+          </a:p>
+          <a:p>
+            <a:r>
+              <a:rPr lang="en-US" altLang="ko-KR" sz="1800" dirty="0">
+                <a:latin typeface="LiberationSerif"/>
+              </a:rPr>
               <a:t>This solves some scalability issues because IDs can scale with the number of database servers.</a:t>
             </a:r>
           </a:p>
@@ -3175,7 +4879,16 @@
               <a:rPr lang="en-US" altLang="ko-KR" sz="1600" dirty="0">
                 <a:latin typeface="LiberationSerif"/>
               </a:rPr>
-              <a:t>Hard to scale with multiple data centers</a:t>
+              <a:t>Hard to scale </a:t>
+            </a:r>
+            <a:r>
+              <a:rPr lang="en-US" altLang="ko-KR" sz="1600" dirty="0">
+                <a:solidFill>
+                  <a:srgbClr val="FF0000"/>
+                </a:solidFill>
+                <a:latin typeface="LiberationSerif"/>
+              </a:rPr>
+              <a:t>with multiple data centers</a:t>
             </a:r>
           </a:p>
           <a:p>
@@ -3184,7 +4897,16 @@
               <a:rPr lang="en-US" altLang="ko-KR" sz="1600" dirty="0">
                 <a:latin typeface="LiberationSerif"/>
               </a:rPr>
-              <a:t>IDs do not go up with time across multiple servers.</a:t>
+              <a:t>IDs </a:t>
+            </a:r>
+            <a:r>
+              <a:rPr lang="en-US" altLang="ko-KR" sz="1600" dirty="0">
+                <a:solidFill>
+                  <a:srgbClr val="FF0000"/>
+                </a:solidFill>
+                <a:latin typeface="LiberationSerif"/>
+              </a:rPr>
+              <a:t>do not go up with time across multiple servers.</a:t>
             </a:r>
           </a:p>
           <a:p>
@@ -3193,9 +4915,21 @@
               <a:rPr lang="en-US" altLang="ko-KR" sz="1600" dirty="0">
                 <a:latin typeface="LiberationSerif"/>
               </a:rPr>
-              <a:t>It does not scale well when a server is added or removed.</a:t>
+              <a:t>It </a:t>
+            </a:r>
+            <a:r>
+              <a:rPr lang="en-US" altLang="ko-KR" sz="1600" dirty="0">
+                <a:solidFill>
+                  <a:srgbClr val="FF0000"/>
+                </a:solidFill>
+                <a:latin typeface="LiberationSerif"/>
+              </a:rPr>
+              <a:t>does not scale well when a server is added or removed.</a:t>
             </a:r>
             <a:endParaRPr lang="ko-KR" altLang="en-US" sz="1600" dirty="0">
+              <a:solidFill>
+                <a:srgbClr val="FF0000"/>
+              </a:solidFill>
               <a:latin typeface="LiberationSerif"/>
             </a:endParaRPr>
           </a:p>
@@ -3373,6 +5107,9 @@
           <a:p>
             <a:r>
               <a:rPr lang="en-US" altLang="ko-KR" sz="1600" dirty="0">
+                <a:solidFill>
+                  <a:srgbClr val="FF0000"/>
+                </a:solidFill>
                 <a:latin typeface="LiberationSerif"/>
               </a:rPr>
               <a:t>UUIDs can be generated independently without coordination between servers.</a:t>
@@ -3396,8 +5133,8 @@
         </p:nvSpPr>
         <p:spPr>
           <a:xfrm>
-            <a:off x="6201168" y="1264257"/>
-            <a:ext cx="5622422" cy="5212715"/>
+            <a:off x="6201168" y="2891644"/>
+            <a:ext cx="5622422" cy="3888151"/>
           </a:xfrm>
           <a:prstGeom prst="rect">
             <a:avLst/>
@@ -3596,13 +5333,16 @@
               <a:rPr lang="en-US" altLang="ko-KR" sz="1600" dirty="0">
                 <a:latin typeface="LiberationSerif"/>
               </a:rPr>
-              <a:t>Generating UUID is simple. No coordination between servers is needed so there will not </a:t>
-            </a:r>
-            <a:r>
-              <a:rPr lang="en-US" altLang="ko-KR" sz="1800" dirty="0">
-                <a:latin typeface="LiberationSerif"/>
-              </a:rPr>
-              <a:t>be any synchronization issues.</a:t>
+              <a:t>Generating UUID is simple. No coordination between servers is needed so there will not be </a:t>
+            </a:r>
+            <a:r>
+              <a:rPr lang="en-US" altLang="ko-KR" sz="1600" dirty="0">
+                <a:solidFill>
+                  <a:srgbClr val="FF0000"/>
+                </a:solidFill>
+                <a:latin typeface="LiberationSerif"/>
+              </a:rPr>
+              <a:t>any synchronization issues.</a:t>
             </a:r>
           </a:p>
           <a:p>
@@ -3628,7 +5368,16 @@
               <a:rPr lang="en-US" altLang="ko-KR" sz="1600" dirty="0">
                 <a:latin typeface="LiberationSerif"/>
               </a:rPr>
-              <a:t>IDs are 128 bits long, but our requirement is 64 bits.</a:t>
+              <a:t>IDs are 128 bits long, but </a:t>
+            </a:r>
+            <a:r>
+              <a:rPr lang="en-US" altLang="ko-KR" sz="1600" dirty="0">
+                <a:solidFill>
+                  <a:srgbClr val="FF0000"/>
+                </a:solidFill>
+                <a:latin typeface="LiberationSerif"/>
+              </a:rPr>
+              <a:t>our requirement is 64 bits.</a:t>
             </a:r>
           </a:p>
           <a:p>
@@ -3637,7 +5386,16 @@
               <a:rPr lang="en-US" altLang="ko-KR" sz="1600" dirty="0">
                 <a:latin typeface="LiberationSerif"/>
               </a:rPr>
-              <a:t>IDs do not go up with time.</a:t>
+              <a:t>IDs </a:t>
+            </a:r>
+            <a:r>
+              <a:rPr lang="en-US" altLang="ko-KR" sz="1600" dirty="0">
+                <a:solidFill>
+                  <a:srgbClr val="FF0000"/>
+                </a:solidFill>
+                <a:latin typeface="LiberationSerif"/>
+              </a:rPr>
+              <a:t>do not go up with time.</a:t>
             </a:r>
           </a:p>
           <a:p>
@@ -3646,7 +5404,16 @@
               <a:rPr lang="en-US" altLang="ko-KR" sz="1600" dirty="0">
                 <a:latin typeface="LiberationSerif"/>
               </a:rPr>
-              <a:t>IDs could be non-numeric.</a:t>
+              <a:t>IDs could be </a:t>
+            </a:r>
+            <a:r>
+              <a:rPr lang="en-US" altLang="ko-KR" sz="1600" dirty="0">
+                <a:solidFill>
+                  <a:srgbClr val="FF0000"/>
+                </a:solidFill>
+                <a:latin typeface="LiberationSerif"/>
+              </a:rPr>
+              <a:t>non-numeric.</a:t>
             </a:r>
           </a:p>
           <a:p>
@@ -3679,7 +5446,7 @@
         </p:blipFill>
         <p:spPr>
           <a:xfrm>
-            <a:off x="132042" y="4843437"/>
+            <a:off x="6096000" y="1084897"/>
             <a:ext cx="5876493" cy="1756147"/>
           </a:xfrm>
           <a:prstGeom prst="rect">
@@ -3708,6 +5475,1095 @@
         <p:cNvPr id="1" name="">
           <a:extLst>
             <a:ext uri="{FF2B5EF4-FFF2-40B4-BE49-F238E27FC236}">
+              <a16:creationId xmlns:a16="http://schemas.microsoft.com/office/drawing/2014/main" id="{180FDE7C-9F40-1D29-6B87-217B465CC7BD}"/>
+            </a:ext>
+          </a:extLst>
+        </p:cNvPr>
+        <p:cNvGrpSpPr/>
+        <p:nvPr/>
+      </p:nvGrpSpPr>
+      <p:grpSpPr>
+        <a:xfrm>
+          <a:off x="0" y="0"/>
+          <a:ext cx="0" cy="0"/>
+          <a:chOff x="0" y="0"/>
+          <a:chExt cx="0" cy="0"/>
+        </a:xfrm>
+      </p:grpSpPr>
+      <p:sp>
+        <p:nvSpPr>
+          <p:cNvPr id="2" name="제목 1">
+            <a:extLst>
+              <a:ext uri="{FF2B5EF4-FFF2-40B4-BE49-F238E27FC236}">
+                <a16:creationId xmlns:a16="http://schemas.microsoft.com/office/drawing/2014/main" id="{EE48CC15-3E96-B48D-08F7-AE12CFE139AA}"/>
+              </a:ext>
+            </a:extLst>
+          </p:cNvPr>
+          <p:cNvSpPr>
+            <a:spLocks noGrp="1"/>
+          </p:cNvSpPr>
+          <p:nvPr>
+            <p:ph type="title"/>
+          </p:nvPr>
+        </p:nvSpPr>
+        <p:spPr/>
+        <p:txBody>
+          <a:bodyPr/>
+          <a:lstStyle/>
+          <a:p>
+            <a:r>
+              <a:rPr lang="en-US" altLang="ko-KR" dirty="0"/>
+              <a:t>Step 2 - Propose high-level design and get buy-in</a:t>
+            </a:r>
+            <a:endParaRPr lang="ko-KR" altLang="en-US" dirty="0"/>
+          </a:p>
+        </p:txBody>
+      </p:sp>
+      <p:sp>
+        <p:nvSpPr>
+          <p:cNvPr id="3" name="내용 개체 틀 2">
+            <a:extLst>
+              <a:ext uri="{FF2B5EF4-FFF2-40B4-BE49-F238E27FC236}">
+                <a16:creationId xmlns:a16="http://schemas.microsoft.com/office/drawing/2014/main" id="{C2F4DE3E-1E7A-5604-A3E6-6914777E25ED}"/>
+              </a:ext>
+            </a:extLst>
+          </p:cNvPr>
+          <p:cNvSpPr>
+            <a:spLocks noGrp="1"/>
+          </p:cNvSpPr>
+          <p:nvPr>
+            <p:ph idx="1"/>
+          </p:nvPr>
+        </p:nvSpPr>
+        <p:spPr>
+          <a:xfrm>
+            <a:off x="372861" y="1260629"/>
+            <a:ext cx="11496525" cy="5057044"/>
+          </a:xfrm>
+        </p:spPr>
+        <p:txBody>
+          <a:bodyPr/>
+          <a:lstStyle/>
+          <a:p>
+            <a:r>
+              <a:rPr lang="en-CA" altLang="ko-KR" sz="1800" kern="100" dirty="0">
+                <a:effectLst/>
+                <a:latin typeface="Aptos" panose="020B0004020202020204" pitchFamily="34" charset="0"/>
+                <a:ea typeface="맑은 고딕" panose="020B0503020000020004" pitchFamily="50" charset="-127"/>
+                <a:cs typeface="Times New Roman" panose="02020603050405020304" pitchFamily="18" charset="0"/>
+              </a:rPr>
+              <a:t>RFC 4122: A Universally Unique </a:t>
+            </a:r>
+            <a:r>
+              <a:rPr lang="en-CA" altLang="ko-KR" sz="1800" kern="100" dirty="0" err="1">
+                <a:effectLst/>
+                <a:latin typeface="Aptos" panose="020B0004020202020204" pitchFamily="34" charset="0"/>
+                <a:ea typeface="맑은 고딕" panose="020B0503020000020004" pitchFamily="50" charset="-127"/>
+                <a:cs typeface="Times New Roman" panose="02020603050405020304" pitchFamily="18" charset="0"/>
+              </a:rPr>
+              <a:t>IDentifier</a:t>
+            </a:r>
+            <a:r>
+              <a:rPr lang="en-CA" altLang="ko-KR" sz="1800" kern="100" dirty="0">
+                <a:effectLst/>
+                <a:latin typeface="Aptos" panose="020B0004020202020204" pitchFamily="34" charset="0"/>
+                <a:ea typeface="맑은 고딕" panose="020B0503020000020004" pitchFamily="50" charset="-127"/>
+                <a:cs typeface="Times New Roman" panose="02020603050405020304" pitchFamily="18" charset="0"/>
+              </a:rPr>
+              <a:t> (UUID) URN Namespace</a:t>
+            </a:r>
+          </a:p>
+          <a:p>
+            <a:r>
+              <a:rPr lang="en-CA" altLang="ko-KR" sz="1800" dirty="0" err="1">
+                <a:effectLst/>
+                <a:latin typeface="Aptos" panose="020B0004020202020204" pitchFamily="34" charset="0"/>
+                <a:ea typeface="맑은 고딕" panose="020B0503020000020004" pitchFamily="50" charset="-127"/>
+                <a:cs typeface="Times New Roman" panose="02020603050405020304" pitchFamily="18" charset="0"/>
+              </a:rPr>
+              <a:t>xxxxxxxx-xxxx-</a:t>
+            </a:r>
+            <a:r>
+              <a:rPr lang="en-CA" altLang="ko-KR" sz="1800" dirty="0" err="1">
+                <a:solidFill>
+                  <a:srgbClr val="FF0000"/>
+                </a:solidFill>
+                <a:effectLst/>
+                <a:latin typeface="Aptos" panose="020B0004020202020204" pitchFamily="34" charset="0"/>
+                <a:ea typeface="맑은 고딕" panose="020B0503020000020004" pitchFamily="50" charset="-127"/>
+                <a:cs typeface="Times New Roman" panose="02020603050405020304" pitchFamily="18" charset="0"/>
+              </a:rPr>
+              <a:t>M</a:t>
+            </a:r>
+            <a:r>
+              <a:rPr lang="en-CA" altLang="ko-KR" sz="1800" dirty="0" err="1">
+                <a:effectLst/>
+                <a:latin typeface="Aptos" panose="020B0004020202020204" pitchFamily="34" charset="0"/>
+                <a:ea typeface="맑은 고딕" panose="020B0503020000020004" pitchFamily="50" charset="-127"/>
+                <a:cs typeface="Times New Roman" panose="02020603050405020304" pitchFamily="18" charset="0"/>
+              </a:rPr>
+              <a:t>xxx-</a:t>
+            </a:r>
+            <a:r>
+              <a:rPr lang="en-CA" altLang="ko-KR" sz="1800" dirty="0" err="1">
+                <a:solidFill>
+                  <a:srgbClr val="FF0000"/>
+                </a:solidFill>
+                <a:effectLst/>
+                <a:latin typeface="Aptos" panose="020B0004020202020204" pitchFamily="34" charset="0"/>
+                <a:ea typeface="맑은 고딕" panose="020B0503020000020004" pitchFamily="50" charset="-127"/>
+                <a:cs typeface="Times New Roman" panose="02020603050405020304" pitchFamily="18" charset="0"/>
+              </a:rPr>
+              <a:t>N</a:t>
+            </a:r>
+            <a:r>
+              <a:rPr lang="en-CA" altLang="ko-KR" sz="1800" dirty="0" err="1">
+                <a:effectLst/>
+                <a:latin typeface="Aptos" panose="020B0004020202020204" pitchFamily="34" charset="0"/>
+                <a:ea typeface="맑은 고딕" panose="020B0503020000020004" pitchFamily="50" charset="-127"/>
+                <a:cs typeface="Times New Roman" panose="02020603050405020304" pitchFamily="18" charset="0"/>
+              </a:rPr>
+              <a:t>xxx-xxxxxxxxxxxx</a:t>
+            </a:r>
+            <a:endParaRPr lang="en-CA" altLang="ko-KR" sz="1800" dirty="0">
+              <a:effectLst/>
+              <a:latin typeface="Aptos" panose="020B0004020202020204" pitchFamily="34" charset="0"/>
+              <a:ea typeface="맑은 고딕" panose="020B0503020000020004" pitchFamily="50" charset="-127"/>
+              <a:cs typeface="Times New Roman" panose="02020603050405020304" pitchFamily="18" charset="0"/>
+            </a:endParaRPr>
+          </a:p>
+          <a:p>
+            <a:pPr lvl="1"/>
+            <a:r>
+              <a:rPr lang="en-US" altLang="ko-KR" sz="1600" dirty="0">
+                <a:effectLst/>
+                <a:latin typeface="Aptos" panose="020B0004020202020204" pitchFamily="34" charset="0"/>
+                <a:ea typeface="맑은 고딕" panose="020B0503020000020004" pitchFamily="50" charset="-127"/>
+                <a:cs typeface="Times New Roman" panose="02020603050405020304" pitchFamily="18" charset="0"/>
+              </a:rPr>
+              <a:t>UUID</a:t>
+            </a:r>
+            <a:r>
+              <a:rPr lang="ko-KR" altLang="en-US" sz="1600" dirty="0">
+                <a:effectLst/>
+                <a:latin typeface="Aptos" panose="020B0004020202020204" pitchFamily="34" charset="0"/>
+                <a:ea typeface="맑은 고딕" panose="020B0503020000020004" pitchFamily="50" charset="-127"/>
+                <a:cs typeface="Times New Roman" panose="02020603050405020304" pitchFamily="18" charset="0"/>
+              </a:rPr>
+              <a:t>는 </a:t>
+            </a:r>
+            <a:r>
+              <a:rPr lang="en-CA" altLang="ko-KR" sz="1600" dirty="0">
+                <a:effectLst/>
+                <a:latin typeface="Aptos" panose="020B0004020202020204" pitchFamily="34" charset="0"/>
+                <a:ea typeface="맑은 고딕" panose="020B0503020000020004" pitchFamily="50" charset="-127"/>
+                <a:cs typeface="Times New Roman" panose="02020603050405020304" pitchFamily="18" charset="0"/>
+              </a:rPr>
+              <a:t>16</a:t>
+            </a:r>
+            <a:r>
+              <a:rPr lang="ko-KR" altLang="ko-KR" sz="1600" dirty="0">
+                <a:effectLst/>
+                <a:latin typeface="Aptos" panose="020B0004020202020204" pitchFamily="34" charset="0"/>
+                <a:ea typeface="맑은 고딕" panose="020B0503020000020004" pitchFamily="50" charset="-127"/>
+                <a:cs typeface="Times New Roman" panose="02020603050405020304" pitchFamily="18" charset="0"/>
+              </a:rPr>
+              <a:t>진수</a:t>
+            </a:r>
+            <a:r>
+              <a:rPr lang="ko-KR" altLang="ko-KR" sz="1600" dirty="0">
+                <a:effectLst/>
+                <a:ea typeface="Aptos" panose="020B0004020202020204" pitchFamily="34" charset="0"/>
+                <a:cs typeface="Times New Roman" panose="02020603050405020304" pitchFamily="18" charset="0"/>
+              </a:rPr>
+              <a:t> </a:t>
+            </a:r>
+            <a:r>
+              <a:rPr lang="ko-KR" altLang="ko-KR" sz="1600" dirty="0">
+                <a:effectLst/>
+                <a:latin typeface="Aptos" panose="020B0004020202020204" pitchFamily="34" charset="0"/>
+                <a:ea typeface="맑은 고딕" panose="020B0503020000020004" pitchFamily="50" charset="-127"/>
+                <a:cs typeface="Times New Roman" panose="02020603050405020304" pitchFamily="18" charset="0"/>
+              </a:rPr>
+              <a:t>값</a:t>
+            </a:r>
+            <a:r>
+              <a:rPr lang="en-US" altLang="ko-KR" sz="1600" dirty="0">
+                <a:effectLst/>
+                <a:latin typeface="Aptos" panose="020B0004020202020204" pitchFamily="34" charset="0"/>
+                <a:ea typeface="맑은 고딕" panose="020B0503020000020004" pitchFamily="50" charset="-127"/>
+                <a:cs typeface="Times New Roman" panose="02020603050405020304" pitchFamily="18" charset="0"/>
+              </a:rPr>
+              <a:t> (</a:t>
+            </a:r>
+            <a:r>
+              <a:rPr lang="en-US" altLang="ko-KR" sz="1600" dirty="0">
+                <a:latin typeface="Aptos" panose="020B0004020202020204" pitchFamily="34" charset="0"/>
+                <a:ea typeface="맑은 고딕" panose="020B0503020000020004" pitchFamily="50" charset="-127"/>
+                <a:cs typeface="Times New Roman" panose="02020603050405020304" pitchFamily="18" charset="0"/>
+              </a:rPr>
+              <a:t>x)</a:t>
+            </a:r>
+            <a:r>
+              <a:rPr lang="ko-KR" altLang="en-US" sz="1600" dirty="0">
+                <a:latin typeface="Aptos" panose="020B0004020202020204" pitchFamily="34" charset="0"/>
+                <a:ea typeface="맑은 고딕" panose="020B0503020000020004" pitchFamily="50" charset="-127"/>
+                <a:cs typeface="Times New Roman" panose="02020603050405020304" pitchFamily="18" charset="0"/>
+              </a:rPr>
+              <a:t> </a:t>
+            </a:r>
+            <a:r>
+              <a:rPr lang="ko-KR" altLang="en-US" sz="1600" dirty="0">
+                <a:effectLst/>
+                <a:latin typeface="Aptos" panose="020B0004020202020204" pitchFamily="34" charset="0"/>
+                <a:ea typeface="맑은 고딕" panose="020B0503020000020004" pitchFamily="50" charset="-127"/>
+                <a:cs typeface="Times New Roman" panose="02020603050405020304" pitchFamily="18" charset="0"/>
+              </a:rPr>
+              <a:t>의 문자열 형식으로 표현됩니다</a:t>
+            </a:r>
+            <a:r>
+              <a:rPr lang="en-US" altLang="ko-KR" sz="1600" dirty="0">
+                <a:effectLst/>
+                <a:latin typeface="Aptos" panose="020B0004020202020204" pitchFamily="34" charset="0"/>
+                <a:ea typeface="맑은 고딕" panose="020B0503020000020004" pitchFamily="50" charset="-127"/>
+                <a:cs typeface="Times New Roman" panose="02020603050405020304" pitchFamily="18" charset="0"/>
+              </a:rPr>
+              <a:t>.</a:t>
+            </a:r>
+          </a:p>
+          <a:p>
+            <a:pPr lvl="1"/>
+            <a:r>
+              <a:rPr lang="en-US" altLang="ko-KR" sz="1600" dirty="0">
+                <a:effectLst/>
+                <a:latin typeface="Aptos" panose="020B0004020202020204" pitchFamily="34" charset="0"/>
+                <a:ea typeface="맑은 고딕" panose="020B0503020000020004" pitchFamily="50" charset="-127"/>
+                <a:cs typeface="Times New Roman" panose="02020603050405020304" pitchFamily="18" charset="0"/>
+              </a:rPr>
+              <a:t>8-4-4-4-12</a:t>
+            </a:r>
+            <a:r>
+              <a:rPr lang="ko-KR" altLang="en-US" sz="1600" dirty="0">
+                <a:effectLst/>
+                <a:latin typeface="Aptos" panose="020B0004020202020204" pitchFamily="34" charset="0"/>
+                <a:ea typeface="맑은 고딕" panose="020B0503020000020004" pitchFamily="50" charset="-127"/>
+                <a:cs typeface="Times New Roman" panose="02020603050405020304" pitchFamily="18" charset="0"/>
+              </a:rPr>
+              <a:t>의 다섯 그룹으로 이루어진 </a:t>
+            </a:r>
+            <a:r>
+              <a:rPr lang="en-US" altLang="ko-KR" sz="1600" dirty="0">
+                <a:effectLst/>
+                <a:latin typeface="Aptos" panose="020B0004020202020204" pitchFamily="34" charset="0"/>
+                <a:ea typeface="맑은 고딕" panose="020B0503020000020004" pitchFamily="50" charset="-127"/>
+                <a:cs typeface="Times New Roman" panose="02020603050405020304" pitchFamily="18" charset="0"/>
+              </a:rPr>
+              <a:t>32</a:t>
+            </a:r>
+            <a:r>
+              <a:rPr lang="ko-KR" altLang="en-US" sz="1600" dirty="0">
+                <a:effectLst/>
+                <a:latin typeface="Aptos" panose="020B0004020202020204" pitchFamily="34" charset="0"/>
+                <a:ea typeface="맑은 고딕" panose="020B0503020000020004" pitchFamily="50" charset="-127"/>
+                <a:cs typeface="Times New Roman" panose="02020603050405020304" pitchFamily="18" charset="0"/>
+              </a:rPr>
+              <a:t>개의 </a:t>
+            </a:r>
+            <a:r>
+              <a:rPr lang="en-US" altLang="ko-KR" sz="1600" dirty="0">
+                <a:effectLst/>
+                <a:latin typeface="Aptos" panose="020B0004020202020204" pitchFamily="34" charset="0"/>
+                <a:ea typeface="맑은 고딕" panose="020B0503020000020004" pitchFamily="50" charset="-127"/>
+                <a:cs typeface="Times New Roman" panose="02020603050405020304" pitchFamily="18" charset="0"/>
+              </a:rPr>
+              <a:t>16</a:t>
+            </a:r>
+            <a:r>
+              <a:rPr lang="ko-KR" altLang="en-US" sz="1600" dirty="0">
+                <a:effectLst/>
+                <a:latin typeface="Aptos" panose="020B0004020202020204" pitchFamily="34" charset="0"/>
+                <a:ea typeface="맑은 고딕" panose="020B0503020000020004" pitchFamily="50" charset="-127"/>
+                <a:cs typeface="Times New Roman" panose="02020603050405020304" pitchFamily="18" charset="0"/>
+              </a:rPr>
+              <a:t>진수 문자이며</a:t>
+            </a:r>
+            <a:r>
+              <a:rPr lang="en-US" altLang="ko-KR" sz="1600" dirty="0">
+                <a:effectLst/>
+                <a:latin typeface="Aptos" panose="020B0004020202020204" pitchFamily="34" charset="0"/>
+                <a:ea typeface="맑은 고딕" panose="020B0503020000020004" pitchFamily="50" charset="-127"/>
+                <a:cs typeface="Times New Roman" panose="02020603050405020304" pitchFamily="18" charset="0"/>
+              </a:rPr>
+              <a:t>, </a:t>
+            </a:r>
+            <a:r>
+              <a:rPr lang="ko-KR" altLang="en-US" sz="1600" dirty="0">
+                <a:effectLst/>
+                <a:latin typeface="Aptos" panose="020B0004020202020204" pitchFamily="34" charset="0"/>
+                <a:ea typeface="맑은 고딕" panose="020B0503020000020004" pitchFamily="50" charset="-127"/>
+                <a:cs typeface="Times New Roman" panose="02020603050405020304" pitchFamily="18" charset="0"/>
+              </a:rPr>
+              <a:t>각 그룹은 하이픈</a:t>
+            </a:r>
+            <a:r>
+              <a:rPr lang="en-US" altLang="ko-KR" sz="1600" dirty="0">
+                <a:effectLst/>
+                <a:latin typeface="Aptos" panose="020B0004020202020204" pitchFamily="34" charset="0"/>
+                <a:ea typeface="맑은 고딕" panose="020B0503020000020004" pitchFamily="50" charset="-127"/>
+                <a:cs typeface="Times New Roman" panose="02020603050405020304" pitchFamily="18" charset="0"/>
+              </a:rPr>
+              <a:t>(-)</a:t>
+            </a:r>
+            <a:r>
+              <a:rPr lang="ko-KR" altLang="en-US" sz="1600" dirty="0">
+                <a:effectLst/>
+                <a:latin typeface="Aptos" panose="020B0004020202020204" pitchFamily="34" charset="0"/>
+                <a:ea typeface="맑은 고딕" panose="020B0503020000020004" pitchFamily="50" charset="-127"/>
+                <a:cs typeface="Times New Roman" panose="02020603050405020304" pitchFamily="18" charset="0"/>
+              </a:rPr>
+              <a:t>으로 구분</a:t>
+            </a:r>
+            <a:endParaRPr lang="en-CA" altLang="ko-KR" sz="1600" dirty="0">
+              <a:effectLst/>
+              <a:latin typeface="Aptos" panose="020B0004020202020204" pitchFamily="34" charset="0"/>
+              <a:ea typeface="맑은 고딕" panose="020B0503020000020004" pitchFamily="50" charset="-127"/>
+              <a:cs typeface="Times New Roman" panose="02020603050405020304" pitchFamily="18" charset="0"/>
+            </a:endParaRPr>
+          </a:p>
+          <a:p>
+            <a:pPr lvl="1"/>
+            <a:r>
+              <a:rPr lang="en-CA" altLang="ko-KR" sz="1600" dirty="0">
+                <a:effectLst/>
+                <a:latin typeface="Aptos" panose="020B0004020202020204" pitchFamily="34" charset="0"/>
+                <a:ea typeface="맑은 고딕" panose="020B0503020000020004" pitchFamily="50" charset="-127"/>
+                <a:cs typeface="Times New Roman" panose="02020603050405020304" pitchFamily="18" charset="0"/>
+              </a:rPr>
+              <a:t>M</a:t>
+            </a:r>
+            <a:r>
+              <a:rPr lang="ko-KR" altLang="ko-KR" sz="1600" dirty="0">
+                <a:effectLst/>
+                <a:latin typeface="Aptos" panose="020B0004020202020204" pitchFamily="34" charset="0"/>
+                <a:ea typeface="맑은 고딕" panose="020B0503020000020004" pitchFamily="50" charset="-127"/>
+                <a:cs typeface="Times New Roman" panose="02020603050405020304" pitchFamily="18" charset="0"/>
+              </a:rPr>
+              <a:t>은</a:t>
+            </a:r>
+            <a:r>
+              <a:rPr lang="en-CA" altLang="ko-KR" sz="1600" dirty="0">
+                <a:effectLst/>
+                <a:latin typeface="Aptos" panose="020B0004020202020204" pitchFamily="34" charset="0"/>
+                <a:ea typeface="맑은 고딕" panose="020B0503020000020004" pitchFamily="50" charset="-127"/>
+                <a:cs typeface="Times New Roman" panose="02020603050405020304" pitchFamily="18" charset="0"/>
+              </a:rPr>
+              <a:t> UUID </a:t>
+            </a:r>
+            <a:r>
+              <a:rPr lang="ko-KR" altLang="ko-KR" sz="1600" dirty="0">
+                <a:effectLst/>
+                <a:latin typeface="Aptos" panose="020B0004020202020204" pitchFamily="34" charset="0"/>
+                <a:ea typeface="맑은 고딕" panose="020B0503020000020004" pitchFamily="50" charset="-127"/>
+                <a:cs typeface="Times New Roman" panose="02020603050405020304" pitchFamily="18" charset="0"/>
+              </a:rPr>
+              <a:t>버전</a:t>
+            </a:r>
+            <a:endParaRPr lang="en-CA" altLang="ko-KR" sz="1600" dirty="0">
+              <a:effectLst/>
+              <a:latin typeface="Aptos" panose="020B0004020202020204" pitchFamily="34" charset="0"/>
+              <a:ea typeface="맑은 고딕" panose="020B0503020000020004" pitchFamily="50" charset="-127"/>
+              <a:cs typeface="Times New Roman" panose="02020603050405020304" pitchFamily="18" charset="0"/>
+            </a:endParaRPr>
+          </a:p>
+          <a:p>
+            <a:pPr lvl="1"/>
+            <a:r>
+              <a:rPr lang="en-CA" altLang="ko-KR" sz="1600" dirty="0">
+                <a:effectLst/>
+                <a:latin typeface="Aptos" panose="020B0004020202020204" pitchFamily="34" charset="0"/>
+                <a:ea typeface="맑은 고딕" panose="020B0503020000020004" pitchFamily="50" charset="-127"/>
+                <a:cs typeface="Times New Roman" panose="02020603050405020304" pitchFamily="18" charset="0"/>
+              </a:rPr>
+              <a:t>N</a:t>
+            </a:r>
+            <a:r>
+              <a:rPr lang="ko-KR" altLang="ko-KR" sz="1600" dirty="0">
+                <a:effectLst/>
+                <a:latin typeface="Aptos" panose="020B0004020202020204" pitchFamily="34" charset="0"/>
+                <a:ea typeface="맑은 고딕" panose="020B0503020000020004" pitchFamily="50" charset="-127"/>
+                <a:cs typeface="Times New Roman" panose="02020603050405020304" pitchFamily="18" charset="0"/>
+              </a:rPr>
+              <a:t>의</a:t>
+            </a:r>
+            <a:r>
+              <a:rPr lang="ko-KR" altLang="ko-KR" sz="1600" dirty="0">
+                <a:effectLst/>
+                <a:ea typeface="Aptos" panose="020B0004020202020204" pitchFamily="34" charset="0"/>
+                <a:cs typeface="Times New Roman" panose="02020603050405020304" pitchFamily="18" charset="0"/>
+              </a:rPr>
+              <a:t> </a:t>
+            </a:r>
+            <a:r>
+              <a:rPr lang="ko-KR" altLang="ko-KR" sz="1600" dirty="0">
+                <a:effectLst/>
+                <a:latin typeface="Aptos" panose="020B0004020202020204" pitchFamily="34" charset="0"/>
+                <a:ea typeface="맑은 고딕" panose="020B0503020000020004" pitchFamily="50" charset="-127"/>
+                <a:cs typeface="Times New Roman" panose="02020603050405020304" pitchFamily="18" charset="0"/>
+              </a:rPr>
+              <a:t>상위</a:t>
+            </a:r>
+            <a:r>
+              <a:rPr lang="ko-KR" altLang="ko-KR" sz="1600" dirty="0">
+                <a:effectLst/>
+                <a:ea typeface="Aptos" panose="020B0004020202020204" pitchFamily="34" charset="0"/>
+                <a:cs typeface="Times New Roman" panose="02020603050405020304" pitchFamily="18" charset="0"/>
+              </a:rPr>
+              <a:t> </a:t>
+            </a:r>
+            <a:r>
+              <a:rPr lang="en-US" altLang="ko-KR" sz="1600" dirty="0">
+                <a:effectLst/>
+                <a:ea typeface="Aptos" panose="020B0004020202020204" pitchFamily="34" charset="0"/>
+                <a:cs typeface="Times New Roman" panose="02020603050405020304" pitchFamily="18" charset="0"/>
+              </a:rPr>
+              <a:t>2</a:t>
+            </a:r>
+            <a:r>
+              <a:rPr lang="ko-KR" altLang="ko-KR" sz="1600" dirty="0">
+                <a:effectLst/>
+                <a:latin typeface="Aptos" panose="020B0004020202020204" pitchFamily="34" charset="0"/>
+                <a:ea typeface="맑은 고딕" panose="020B0503020000020004" pitchFamily="50" charset="-127"/>
+                <a:cs typeface="Times New Roman" panose="02020603050405020304" pitchFamily="18" charset="0"/>
+              </a:rPr>
+              <a:t>비</a:t>
+            </a:r>
+            <a:r>
+              <a:rPr lang="ko-KR" altLang="en-US" sz="1600" dirty="0">
+                <a:effectLst/>
+                <a:latin typeface="Aptos" panose="020B0004020202020204" pitchFamily="34" charset="0"/>
+                <a:ea typeface="맑은 고딕" panose="020B0503020000020004" pitchFamily="50" charset="-127"/>
+                <a:cs typeface="Times New Roman" panose="02020603050405020304" pitchFamily="18" charset="0"/>
+              </a:rPr>
+              <a:t>트 </a:t>
+            </a:r>
+            <a:r>
+              <a:rPr lang="en-CA" altLang="ko-KR" sz="1600" dirty="0">
+                <a:effectLst/>
+                <a:latin typeface="Aptos" panose="020B0004020202020204" pitchFamily="34" charset="0"/>
+                <a:ea typeface="맑은 고딕" panose="020B0503020000020004" pitchFamily="50" charset="-127"/>
+                <a:cs typeface="Times New Roman" panose="02020603050405020304" pitchFamily="18" charset="0"/>
+              </a:rPr>
+              <a:t>UUID</a:t>
+            </a:r>
+            <a:r>
+              <a:rPr lang="ko-KR" altLang="ko-KR" sz="1600" dirty="0">
+                <a:effectLst/>
+                <a:latin typeface="Aptos" panose="020B0004020202020204" pitchFamily="34" charset="0"/>
+                <a:ea typeface="맑은 고딕" panose="020B0503020000020004" pitchFamily="50" charset="-127"/>
+                <a:cs typeface="Times New Roman" panose="02020603050405020304" pitchFamily="18" charset="0"/>
+              </a:rPr>
+              <a:t>의</a:t>
+            </a:r>
+            <a:r>
+              <a:rPr lang="ko-KR" altLang="ko-KR" sz="1600" dirty="0">
+                <a:effectLst/>
+                <a:ea typeface="Aptos" panose="020B0004020202020204" pitchFamily="34" charset="0"/>
+                <a:cs typeface="Times New Roman" panose="02020603050405020304" pitchFamily="18" charset="0"/>
+              </a:rPr>
+              <a:t> </a:t>
+            </a:r>
+            <a:r>
+              <a:rPr lang="en-CA" altLang="ko-KR" sz="1600" b="0" i="0" dirty="0">
+                <a:solidFill>
+                  <a:srgbClr val="0D0D0D"/>
+                </a:solidFill>
+                <a:effectLst/>
+                <a:latin typeface="Söhne"/>
+              </a:rPr>
+              <a:t>variant</a:t>
+            </a:r>
+            <a:endParaRPr lang="en-CA" altLang="ko-KR" sz="1600" dirty="0">
+              <a:effectLst/>
+              <a:latin typeface="Aptos" panose="020B0004020202020204" pitchFamily="34" charset="0"/>
+              <a:ea typeface="맑은 고딕" panose="020B0503020000020004" pitchFamily="50" charset="-127"/>
+              <a:cs typeface="Times New Roman" panose="02020603050405020304" pitchFamily="18" charset="0"/>
+            </a:endParaRPr>
+          </a:p>
+          <a:p>
+            <a:r>
+              <a:rPr lang="en-CA" altLang="ko-KR" sz="1800" dirty="0">
+                <a:effectLst/>
+                <a:latin typeface="Aptos" panose="020B0004020202020204" pitchFamily="34" charset="0"/>
+                <a:ea typeface="맑은 고딕" panose="020B0503020000020004" pitchFamily="50" charset="-127"/>
+                <a:cs typeface="Times New Roman" panose="02020603050405020304" pitchFamily="18" charset="0"/>
+              </a:rPr>
+              <a:t>0b017903-5590-</a:t>
+            </a:r>
+            <a:r>
+              <a:rPr lang="en-CA" altLang="ko-KR" sz="1800" dirty="0">
+                <a:solidFill>
+                  <a:srgbClr val="FF0000"/>
+                </a:solidFill>
+                <a:effectLst/>
+                <a:latin typeface="Aptos" panose="020B0004020202020204" pitchFamily="34" charset="0"/>
+                <a:ea typeface="맑은 고딕" panose="020B0503020000020004" pitchFamily="50" charset="-127"/>
+                <a:cs typeface="Times New Roman" panose="02020603050405020304" pitchFamily="18" charset="0"/>
+              </a:rPr>
+              <a:t>4</a:t>
+            </a:r>
+            <a:r>
+              <a:rPr lang="en-CA" altLang="ko-KR" sz="1800" dirty="0">
+                <a:effectLst/>
+                <a:latin typeface="Aptos" panose="020B0004020202020204" pitchFamily="34" charset="0"/>
+                <a:ea typeface="맑은 고딕" panose="020B0503020000020004" pitchFamily="50" charset="-127"/>
+                <a:cs typeface="Times New Roman" panose="02020603050405020304" pitchFamily="18" charset="0"/>
+              </a:rPr>
+              <a:t>c34-</a:t>
+            </a:r>
+            <a:r>
+              <a:rPr lang="en-CA" altLang="ko-KR" sz="1800" dirty="0">
+                <a:solidFill>
+                  <a:srgbClr val="FF0000"/>
+                </a:solidFill>
+                <a:effectLst/>
+                <a:latin typeface="Aptos" panose="020B0004020202020204" pitchFamily="34" charset="0"/>
+                <a:ea typeface="맑은 고딕" panose="020B0503020000020004" pitchFamily="50" charset="-127"/>
+                <a:cs typeface="Times New Roman" panose="02020603050405020304" pitchFamily="18" charset="0"/>
+              </a:rPr>
+              <a:t>8</a:t>
+            </a:r>
+            <a:r>
+              <a:rPr lang="en-CA" altLang="ko-KR" sz="1800" dirty="0">
+                <a:effectLst/>
+                <a:latin typeface="Aptos" panose="020B0004020202020204" pitchFamily="34" charset="0"/>
+                <a:ea typeface="맑은 고딕" panose="020B0503020000020004" pitchFamily="50" charset="-127"/>
+                <a:cs typeface="Times New Roman" panose="02020603050405020304" pitchFamily="18" charset="0"/>
+              </a:rPr>
+              <a:t>a74-d1f113ac5</a:t>
+            </a:r>
+          </a:p>
+          <a:p>
+            <a:pPr lvl="1"/>
+            <a:r>
+              <a:rPr lang="en-US" altLang="ko-KR" sz="1600" dirty="0">
+                <a:effectLst/>
+                <a:latin typeface="Aptos" panose="020B0004020202020204" pitchFamily="34" charset="0"/>
+                <a:ea typeface="맑은 고딕" panose="020B0503020000020004" pitchFamily="50" charset="-127"/>
+                <a:cs typeface="Times New Roman" panose="02020603050405020304" pitchFamily="18" charset="0"/>
+              </a:rPr>
+              <a:t>UUID</a:t>
+            </a:r>
+            <a:r>
+              <a:rPr lang="ko-KR" altLang="en-US" sz="1600" dirty="0">
+                <a:effectLst/>
+                <a:latin typeface="Aptos" panose="020B0004020202020204" pitchFamily="34" charset="0"/>
+                <a:ea typeface="맑은 고딕" panose="020B0503020000020004" pitchFamily="50" charset="-127"/>
+                <a:cs typeface="Times New Roman" panose="02020603050405020304" pitchFamily="18" charset="0"/>
+              </a:rPr>
+              <a:t>의 대부분은 난수 생성기를 사용하여 총 </a:t>
+            </a:r>
+            <a:r>
+              <a:rPr lang="en-US" altLang="ko-KR" sz="1600" dirty="0">
+                <a:effectLst/>
+                <a:latin typeface="Aptos" panose="020B0004020202020204" pitchFamily="34" charset="0"/>
+                <a:ea typeface="맑은 고딕" panose="020B0503020000020004" pitchFamily="50" charset="-127"/>
+                <a:cs typeface="Times New Roman" panose="02020603050405020304" pitchFamily="18" charset="0"/>
+              </a:rPr>
+              <a:t>128</a:t>
+            </a:r>
+            <a:r>
+              <a:rPr lang="ko-KR" altLang="en-US" sz="1600" dirty="0">
+                <a:effectLst/>
+                <a:latin typeface="Aptos" panose="020B0004020202020204" pitchFamily="34" charset="0"/>
+                <a:ea typeface="맑은 고딕" panose="020B0503020000020004" pitchFamily="50" charset="-127"/>
+                <a:cs typeface="Times New Roman" panose="02020603050405020304" pitchFamily="18" charset="0"/>
+              </a:rPr>
+              <a:t>비트 중에서 </a:t>
+            </a:r>
+            <a:r>
+              <a:rPr lang="en-US" altLang="ko-KR" sz="1600" dirty="0">
+                <a:effectLst/>
+                <a:latin typeface="Aptos" panose="020B0004020202020204" pitchFamily="34" charset="0"/>
+                <a:ea typeface="맑은 고딕" panose="020B0503020000020004" pitchFamily="50" charset="-127"/>
+                <a:cs typeface="Times New Roman" panose="02020603050405020304" pitchFamily="18" charset="0"/>
+              </a:rPr>
+              <a:t>122</a:t>
+            </a:r>
+            <a:r>
+              <a:rPr lang="ko-KR" altLang="en-US" sz="1600" dirty="0">
+                <a:effectLst/>
+                <a:latin typeface="Aptos" panose="020B0004020202020204" pitchFamily="34" charset="0"/>
+                <a:ea typeface="맑은 고딕" panose="020B0503020000020004" pitchFamily="50" charset="-127"/>
+                <a:cs typeface="Times New Roman" panose="02020603050405020304" pitchFamily="18" charset="0"/>
+              </a:rPr>
+              <a:t>비트가 무작위로 선택됩니다</a:t>
+            </a:r>
+            <a:r>
+              <a:rPr lang="en-US" altLang="ko-KR" sz="1600" dirty="0">
+                <a:effectLst/>
+                <a:latin typeface="Aptos" panose="020B0004020202020204" pitchFamily="34" charset="0"/>
+                <a:ea typeface="맑은 고딕" panose="020B0503020000020004" pitchFamily="50" charset="-127"/>
+                <a:cs typeface="Times New Roman" panose="02020603050405020304" pitchFamily="18" charset="0"/>
+              </a:rPr>
+              <a:t>.</a:t>
+            </a:r>
+          </a:p>
+          <a:p>
+            <a:pPr lvl="1"/>
+            <a:r>
+              <a:rPr lang="en-US" altLang="ko-KR" sz="1600" dirty="0">
+                <a:effectLst/>
+                <a:latin typeface="Aptos" panose="020B0004020202020204" pitchFamily="34" charset="0"/>
+                <a:ea typeface="맑은 고딕" panose="020B0503020000020004" pitchFamily="50" charset="-127"/>
+                <a:cs typeface="Times New Roman" panose="02020603050405020304" pitchFamily="18" charset="0"/>
+              </a:rPr>
+              <a:t>13</a:t>
+            </a:r>
+            <a:r>
+              <a:rPr lang="ko-KR" altLang="en-US" sz="1600" dirty="0">
+                <a:effectLst/>
+                <a:latin typeface="Aptos" panose="020B0004020202020204" pitchFamily="34" charset="0"/>
+                <a:ea typeface="맑은 고딕" panose="020B0503020000020004" pitchFamily="50" charset="-127"/>
+                <a:cs typeface="Times New Roman" panose="02020603050405020304" pitchFamily="18" charset="0"/>
+              </a:rPr>
+              <a:t>번째 자리의 </a:t>
+            </a:r>
+            <a:r>
+              <a:rPr lang="en-US" altLang="ko-KR" sz="1600" dirty="0">
+                <a:effectLst/>
+                <a:latin typeface="Aptos" panose="020B0004020202020204" pitchFamily="34" charset="0"/>
+                <a:ea typeface="맑은 고딕" panose="020B0503020000020004" pitchFamily="50" charset="-127"/>
+                <a:cs typeface="Times New Roman" panose="02020603050405020304" pitchFamily="18" charset="0"/>
+              </a:rPr>
+              <a:t>4</a:t>
+            </a:r>
+            <a:r>
+              <a:rPr lang="ko-KR" altLang="en-US" sz="1600" dirty="0">
+                <a:effectLst/>
+                <a:latin typeface="Aptos" panose="020B0004020202020204" pitchFamily="34" charset="0"/>
+                <a:ea typeface="맑은 고딕" panose="020B0503020000020004" pitchFamily="50" charset="-127"/>
+                <a:cs typeface="Times New Roman" panose="02020603050405020304" pitchFamily="18" charset="0"/>
+              </a:rPr>
+              <a:t>비트는 </a:t>
+            </a:r>
+            <a:r>
+              <a:rPr lang="en-US" altLang="ko-KR" sz="1600" dirty="0">
+                <a:effectLst/>
+                <a:latin typeface="Aptos" panose="020B0004020202020204" pitchFamily="34" charset="0"/>
+                <a:ea typeface="맑은 고딕" panose="020B0503020000020004" pitchFamily="50" charset="-127"/>
+                <a:cs typeface="Times New Roman" panose="02020603050405020304" pitchFamily="18" charset="0"/>
+              </a:rPr>
+              <a:t>UUID </a:t>
+            </a:r>
+            <a:r>
+              <a:rPr lang="ko-KR" altLang="en-US" sz="1600" dirty="0" err="1">
+                <a:latin typeface="Aptos" panose="020B0004020202020204" pitchFamily="34" charset="0"/>
+                <a:ea typeface="맑은 고딕" panose="020B0503020000020004" pitchFamily="50" charset="-127"/>
+                <a:cs typeface="Times New Roman" panose="02020603050405020304" pitchFamily="18" charset="0"/>
+              </a:rPr>
+              <a:t>버전읠</a:t>
+            </a:r>
+            <a:r>
+              <a:rPr lang="ko-KR" altLang="en-US" sz="1600" dirty="0">
+                <a:latin typeface="Aptos" panose="020B0004020202020204" pitchFamily="34" charset="0"/>
+                <a:ea typeface="맑은 고딕" panose="020B0503020000020004" pitchFamily="50" charset="-127"/>
+                <a:cs typeface="Times New Roman" panose="02020603050405020304" pitchFamily="18" charset="0"/>
+              </a:rPr>
+              <a:t> 의미합니다</a:t>
+            </a:r>
+            <a:r>
+              <a:rPr lang="en-US" altLang="ko-KR" sz="1600" dirty="0">
+                <a:latin typeface="Aptos" panose="020B0004020202020204" pitchFamily="34" charset="0"/>
+                <a:ea typeface="맑은 고딕" panose="020B0503020000020004" pitchFamily="50" charset="-127"/>
+                <a:cs typeface="Times New Roman" panose="02020603050405020304" pitchFamily="18" charset="0"/>
+              </a:rPr>
+              <a:t>. </a:t>
+            </a:r>
+            <a:r>
+              <a:rPr lang="ko-KR" altLang="en-US" sz="1600" dirty="0">
+                <a:effectLst/>
+                <a:latin typeface="Aptos" panose="020B0004020202020204" pitchFamily="34" charset="0"/>
+                <a:ea typeface="맑은 고딕" panose="020B0503020000020004" pitchFamily="50" charset="-127"/>
+                <a:cs typeface="Times New Roman" panose="02020603050405020304" pitchFamily="18" charset="0"/>
+              </a:rPr>
+              <a:t>예제는 </a:t>
+            </a:r>
+            <a:r>
+              <a:rPr lang="ko-KR" altLang="ko-KR" sz="1600" dirty="0">
+                <a:effectLst/>
+                <a:latin typeface="Aptos" panose="020B0004020202020204" pitchFamily="34" charset="0"/>
+                <a:ea typeface="맑은 고딕" panose="020B0503020000020004" pitchFamily="50" charset="-127"/>
+                <a:cs typeface="Times New Roman" panose="02020603050405020304" pitchFamily="18" charset="0"/>
+              </a:rPr>
+              <a:t>버전</a:t>
+            </a:r>
+            <a:r>
+              <a:rPr lang="en-CA" altLang="ko-KR" sz="1600" dirty="0">
+                <a:effectLst/>
+                <a:latin typeface="Aptos" panose="020B0004020202020204" pitchFamily="34" charset="0"/>
+                <a:ea typeface="맑은 고딕" panose="020B0503020000020004" pitchFamily="50" charset="-127"/>
+                <a:cs typeface="Times New Roman" panose="02020603050405020304" pitchFamily="18" charset="0"/>
+              </a:rPr>
+              <a:t> 4 UUID</a:t>
+            </a:r>
+            <a:r>
+              <a:rPr lang="ko-KR" altLang="en-US" sz="1600" dirty="0">
+                <a:latin typeface="Aptos" panose="020B0004020202020204" pitchFamily="34" charset="0"/>
+                <a:ea typeface="맑은 고딕" panose="020B0503020000020004" pitchFamily="50" charset="-127"/>
+                <a:cs typeface="Times New Roman" panose="02020603050405020304" pitchFamily="18" charset="0"/>
+              </a:rPr>
+              <a:t>를 의미합니다</a:t>
+            </a:r>
+            <a:r>
+              <a:rPr lang="en-US" altLang="ko-KR" sz="1600" dirty="0">
+                <a:latin typeface="Aptos" panose="020B0004020202020204" pitchFamily="34" charset="0"/>
+                <a:ea typeface="맑은 고딕" panose="020B0503020000020004" pitchFamily="50" charset="-127"/>
+                <a:cs typeface="Times New Roman" panose="02020603050405020304" pitchFamily="18" charset="0"/>
+              </a:rPr>
+              <a:t>.</a:t>
+            </a:r>
+          </a:p>
+          <a:p>
+            <a:pPr lvl="1"/>
+            <a:r>
+              <a:rPr lang="en-US" altLang="ko-KR" sz="1600" dirty="0">
+                <a:latin typeface="Aptos" panose="020B0004020202020204" pitchFamily="34" charset="0"/>
+                <a:ea typeface="맑은 고딕" panose="020B0503020000020004" pitchFamily="50" charset="-127"/>
+                <a:cs typeface="Times New Roman" panose="02020603050405020304" pitchFamily="18" charset="0"/>
+              </a:rPr>
+              <a:t>17</a:t>
+            </a:r>
+            <a:r>
+              <a:rPr lang="ko-KR" altLang="en-US" sz="1600" dirty="0">
+                <a:latin typeface="Aptos" panose="020B0004020202020204" pitchFamily="34" charset="0"/>
+                <a:ea typeface="맑은 고딕" panose="020B0503020000020004" pitchFamily="50" charset="-127"/>
+                <a:cs typeface="Times New Roman" panose="02020603050405020304" pitchFamily="18" charset="0"/>
+              </a:rPr>
+              <a:t>번째 자리의 상위 </a:t>
+            </a:r>
+            <a:r>
+              <a:rPr lang="en-US" altLang="ko-KR" sz="1600" dirty="0">
+                <a:latin typeface="Aptos" panose="020B0004020202020204" pitchFamily="34" charset="0"/>
+                <a:ea typeface="맑은 고딕" panose="020B0503020000020004" pitchFamily="50" charset="-127"/>
+                <a:cs typeface="Times New Roman" panose="02020603050405020304" pitchFamily="18" charset="0"/>
+              </a:rPr>
+              <a:t>2</a:t>
+            </a:r>
+            <a:r>
+              <a:rPr lang="ko-KR" altLang="en-US" sz="1600" dirty="0">
+                <a:latin typeface="Aptos" panose="020B0004020202020204" pitchFamily="34" charset="0"/>
+                <a:ea typeface="맑은 고딕" panose="020B0503020000020004" pitchFamily="50" charset="-127"/>
+                <a:cs typeface="Times New Roman" panose="02020603050405020304" pitchFamily="18" charset="0"/>
+              </a:rPr>
+              <a:t>비트는 </a:t>
+            </a:r>
+            <a:r>
+              <a:rPr lang="en-US" altLang="ko-KR" sz="1600" dirty="0">
+                <a:latin typeface="Aptos" panose="020B0004020202020204" pitchFamily="34" charset="0"/>
+                <a:ea typeface="맑은 고딕" panose="020B0503020000020004" pitchFamily="50" charset="-127"/>
+                <a:cs typeface="Times New Roman" panose="02020603050405020304" pitchFamily="18" charset="0"/>
+              </a:rPr>
+              <a:t>UUID</a:t>
+            </a:r>
+            <a:r>
+              <a:rPr lang="ko-KR" altLang="en-US" sz="1600" dirty="0">
+                <a:latin typeface="Aptos" panose="020B0004020202020204" pitchFamily="34" charset="0"/>
+                <a:ea typeface="맑은 고딕" panose="020B0503020000020004" pitchFamily="50" charset="-127"/>
+                <a:cs typeface="Times New Roman" panose="02020603050405020304" pitchFamily="18" charset="0"/>
+              </a:rPr>
+              <a:t>의 </a:t>
+            </a:r>
+            <a:r>
+              <a:rPr lang="en-CA" altLang="ko-KR" sz="1600" b="0" i="0" dirty="0">
+                <a:solidFill>
+                  <a:srgbClr val="0D0D0D"/>
+                </a:solidFill>
+                <a:effectLst/>
+                <a:latin typeface="Söhne"/>
+              </a:rPr>
+              <a:t>variant </a:t>
+            </a:r>
+            <a:r>
+              <a:rPr lang="ko-KR" altLang="en-US" sz="1600" dirty="0">
+                <a:latin typeface="Aptos" panose="020B0004020202020204" pitchFamily="34" charset="0"/>
+                <a:ea typeface="맑은 고딕" panose="020B0503020000020004" pitchFamily="50" charset="-127"/>
+                <a:cs typeface="Times New Roman" panose="02020603050405020304" pitchFamily="18" charset="0"/>
+              </a:rPr>
+              <a:t>을 의미합니다</a:t>
+            </a:r>
+            <a:r>
+              <a:rPr lang="en-US" altLang="ko-KR" sz="1600" dirty="0">
+                <a:latin typeface="Aptos" panose="020B0004020202020204" pitchFamily="34" charset="0"/>
+                <a:ea typeface="맑은 고딕" panose="020B0503020000020004" pitchFamily="50" charset="-127"/>
+                <a:cs typeface="Times New Roman" panose="02020603050405020304" pitchFamily="18" charset="0"/>
+              </a:rPr>
+              <a:t>.</a:t>
+            </a:r>
+          </a:p>
+          <a:p>
+            <a:pPr lvl="1"/>
+            <a:r>
+              <a:rPr lang="ko-KR" altLang="en-US" sz="1600" dirty="0">
+                <a:latin typeface="Aptos" panose="020B0004020202020204" pitchFamily="34" charset="0"/>
+                <a:ea typeface="맑은 고딕" panose="020B0503020000020004" pitchFamily="50" charset="-127"/>
+                <a:cs typeface="Times New Roman" panose="02020603050405020304" pitchFamily="18" charset="0"/>
+              </a:rPr>
+              <a:t> </a:t>
+            </a:r>
+            <a:r>
+              <a:rPr lang="en-US" altLang="ko-KR" sz="1600" dirty="0">
+                <a:latin typeface="Aptos" panose="020B0004020202020204" pitchFamily="34" charset="0"/>
+                <a:ea typeface="맑은 고딕" panose="020B0503020000020004" pitchFamily="50" charset="-127"/>
+                <a:cs typeface="Times New Roman" panose="02020603050405020304" pitchFamily="18" charset="0"/>
+              </a:rPr>
+              <a:t>"variant"</a:t>
+            </a:r>
+            <a:r>
+              <a:rPr lang="ko-KR" altLang="en-US" sz="1600" dirty="0">
+                <a:latin typeface="Aptos" panose="020B0004020202020204" pitchFamily="34" charset="0"/>
+                <a:ea typeface="맑은 고딕" panose="020B0503020000020004" pitchFamily="50" charset="-127"/>
+                <a:cs typeface="Times New Roman" panose="02020603050405020304" pitchFamily="18" charset="0"/>
+              </a:rPr>
+              <a:t>는 </a:t>
+            </a:r>
+            <a:r>
+              <a:rPr lang="en-US" altLang="ko-KR" sz="1600" dirty="0">
+                <a:latin typeface="Aptos" panose="020B0004020202020204" pitchFamily="34" charset="0"/>
+                <a:ea typeface="맑은 고딕" panose="020B0503020000020004" pitchFamily="50" charset="-127"/>
+                <a:cs typeface="Times New Roman" panose="02020603050405020304" pitchFamily="18" charset="0"/>
+              </a:rPr>
+              <a:t>UUID</a:t>
+            </a:r>
+            <a:r>
+              <a:rPr lang="ko-KR" altLang="en-US" sz="1600" dirty="0">
+                <a:latin typeface="Aptos" panose="020B0004020202020204" pitchFamily="34" charset="0"/>
+                <a:ea typeface="맑은 고딕" panose="020B0503020000020004" pitchFamily="50" charset="-127"/>
+                <a:cs typeface="Times New Roman" panose="02020603050405020304" pitchFamily="18" charset="0"/>
+              </a:rPr>
+              <a:t>가 어떻게 생성되었는지를 나타냅니다</a:t>
+            </a:r>
+            <a:r>
+              <a:rPr lang="en-US" altLang="ko-KR" sz="1600" dirty="0">
+                <a:latin typeface="Aptos" panose="020B0004020202020204" pitchFamily="34" charset="0"/>
+                <a:ea typeface="맑은 고딕" panose="020B0503020000020004" pitchFamily="50" charset="-127"/>
+                <a:cs typeface="Times New Roman" panose="02020603050405020304" pitchFamily="18" charset="0"/>
+              </a:rPr>
+              <a:t>.</a:t>
+            </a:r>
+          </a:p>
+          <a:p>
+            <a:pPr lvl="2"/>
+            <a:r>
+              <a:rPr lang="ko-KR" altLang="en-US" sz="1400" dirty="0">
+                <a:latin typeface="Aptos" panose="020B0004020202020204" pitchFamily="34" charset="0"/>
+                <a:ea typeface="맑은 고딕" panose="020B0503020000020004" pitchFamily="50" charset="-127"/>
+                <a:cs typeface="Times New Roman" panose="02020603050405020304" pitchFamily="18" charset="0"/>
+              </a:rPr>
+              <a:t>버전 </a:t>
+            </a:r>
+            <a:r>
+              <a:rPr lang="en-US" altLang="ko-KR" sz="1400" dirty="0">
+                <a:latin typeface="Aptos" panose="020B0004020202020204" pitchFamily="34" charset="0"/>
+                <a:ea typeface="맑은 고딕" panose="020B0503020000020004" pitchFamily="50" charset="-127"/>
+                <a:cs typeface="Times New Roman" panose="02020603050405020304" pitchFamily="18" charset="0"/>
+              </a:rPr>
+              <a:t>4 UUID</a:t>
+            </a:r>
+            <a:r>
+              <a:rPr lang="ko-KR" altLang="en-US" sz="1400" dirty="0">
+                <a:latin typeface="Aptos" panose="020B0004020202020204" pitchFamily="34" charset="0"/>
+                <a:ea typeface="맑은 고딕" panose="020B0503020000020004" pitchFamily="50" charset="-127"/>
+                <a:cs typeface="Times New Roman" panose="02020603050405020304" pitchFamily="18" charset="0"/>
+              </a:rPr>
+              <a:t>에서는 </a:t>
+            </a:r>
+            <a:r>
+              <a:rPr lang="en-US" altLang="ko-KR" sz="1400" dirty="0">
+                <a:latin typeface="Aptos" panose="020B0004020202020204" pitchFamily="34" charset="0"/>
+                <a:ea typeface="맑은 고딕" panose="020B0503020000020004" pitchFamily="50" charset="-127"/>
+                <a:cs typeface="Times New Roman" panose="02020603050405020304" pitchFamily="18" charset="0"/>
+              </a:rPr>
+              <a:t>variant</a:t>
+            </a:r>
+            <a:r>
+              <a:rPr lang="ko-KR" altLang="en-US" sz="1400" dirty="0">
+                <a:latin typeface="Aptos" panose="020B0004020202020204" pitchFamily="34" charset="0"/>
+                <a:ea typeface="맑은 고딕" panose="020B0503020000020004" pitchFamily="50" charset="-127"/>
+                <a:cs typeface="Times New Roman" panose="02020603050405020304" pitchFamily="18" charset="0"/>
+              </a:rPr>
+              <a:t> 비트가 </a:t>
+            </a:r>
+            <a:r>
+              <a:rPr lang="en-US" altLang="ko-KR" sz="1400" dirty="0">
+                <a:latin typeface="Aptos" panose="020B0004020202020204" pitchFamily="34" charset="0"/>
+                <a:ea typeface="맑은 고딕" panose="020B0503020000020004" pitchFamily="50" charset="-127"/>
+                <a:cs typeface="Times New Roman" panose="02020603050405020304" pitchFamily="18" charset="0"/>
+              </a:rPr>
+              <a:t>10</a:t>
+            </a:r>
+            <a:r>
+              <a:rPr lang="ko-KR" altLang="en-US" sz="1400" dirty="0">
+                <a:latin typeface="Aptos" panose="020B0004020202020204" pitchFamily="34" charset="0"/>
+                <a:ea typeface="맑은 고딕" panose="020B0503020000020004" pitchFamily="50" charset="-127"/>
+                <a:cs typeface="Times New Roman" panose="02020603050405020304" pitchFamily="18" charset="0"/>
+              </a:rPr>
+              <a:t>으로 설정됩니다</a:t>
+            </a:r>
+            <a:r>
+              <a:rPr lang="en-US" altLang="ko-KR" sz="1400" dirty="0">
+                <a:latin typeface="Aptos" panose="020B0004020202020204" pitchFamily="34" charset="0"/>
+                <a:ea typeface="맑은 고딕" panose="020B0503020000020004" pitchFamily="50" charset="-127"/>
+                <a:cs typeface="Times New Roman" panose="02020603050405020304" pitchFamily="18" charset="0"/>
+              </a:rPr>
+              <a:t>. </a:t>
+            </a:r>
+          </a:p>
+          <a:p>
+            <a:pPr lvl="2"/>
+            <a:r>
+              <a:rPr lang="en-US" altLang="ko-KR" sz="1400" dirty="0">
+                <a:latin typeface="Aptos" panose="020B0004020202020204" pitchFamily="34" charset="0"/>
+                <a:ea typeface="맑은 고딕" panose="020B0503020000020004" pitchFamily="50" charset="-127"/>
+                <a:cs typeface="Times New Roman" panose="02020603050405020304" pitchFamily="18" charset="0"/>
+              </a:rPr>
+              <a:t>10 </a:t>
+            </a:r>
+            <a:r>
+              <a:rPr lang="ko-KR" altLang="en-US" sz="1400" dirty="0">
+                <a:latin typeface="Aptos" panose="020B0004020202020204" pitchFamily="34" charset="0"/>
+                <a:ea typeface="맑은 고딕" panose="020B0503020000020004" pitchFamily="50" charset="-127"/>
+                <a:cs typeface="Times New Roman" panose="02020603050405020304" pitchFamily="18" charset="0"/>
+              </a:rPr>
+              <a:t>비트 패턴은 해당 </a:t>
+            </a:r>
+            <a:r>
+              <a:rPr lang="en-US" altLang="ko-KR" sz="1400" dirty="0">
+                <a:latin typeface="Aptos" panose="020B0004020202020204" pitchFamily="34" charset="0"/>
+                <a:ea typeface="맑은 고딕" panose="020B0503020000020004" pitchFamily="50" charset="-127"/>
+                <a:cs typeface="Times New Roman" panose="02020603050405020304" pitchFamily="18" charset="0"/>
+              </a:rPr>
+              <a:t>UUID</a:t>
+            </a:r>
+            <a:r>
+              <a:rPr lang="ko-KR" altLang="en-US" sz="1400" dirty="0">
+                <a:latin typeface="Aptos" panose="020B0004020202020204" pitchFamily="34" charset="0"/>
+                <a:ea typeface="맑은 고딕" panose="020B0503020000020004" pitchFamily="50" charset="-127"/>
+                <a:cs typeface="Times New Roman" panose="02020603050405020304" pitchFamily="18" charset="0"/>
+              </a:rPr>
+              <a:t>가 랜덤하게 생성된다는 것을 나타내며</a:t>
+            </a:r>
+            <a:r>
+              <a:rPr lang="en-US" altLang="ko-KR" sz="1400" dirty="0">
+                <a:latin typeface="Aptos" panose="020B0004020202020204" pitchFamily="34" charset="0"/>
+                <a:ea typeface="맑은 고딕" panose="020B0503020000020004" pitchFamily="50" charset="-127"/>
+                <a:cs typeface="Times New Roman" panose="02020603050405020304" pitchFamily="18" charset="0"/>
+              </a:rPr>
+              <a:t>, "variant" </a:t>
+            </a:r>
+            <a:r>
+              <a:rPr lang="ko-KR" altLang="en-US" sz="1400" dirty="0">
+                <a:latin typeface="Aptos" panose="020B0004020202020204" pitchFamily="34" charset="0"/>
+                <a:ea typeface="맑은 고딕" panose="020B0503020000020004" pitchFamily="50" charset="-127"/>
+                <a:cs typeface="Times New Roman" panose="02020603050405020304" pitchFamily="18" charset="0"/>
+              </a:rPr>
+              <a:t>중 하나인 </a:t>
+            </a:r>
+            <a:r>
+              <a:rPr lang="en-US" altLang="ko-KR" sz="1400" dirty="0">
+                <a:latin typeface="Aptos" panose="020B0004020202020204" pitchFamily="34" charset="0"/>
+                <a:ea typeface="맑은 고딕" panose="020B0503020000020004" pitchFamily="50" charset="-127"/>
+                <a:cs typeface="Times New Roman" panose="02020603050405020304" pitchFamily="18" charset="0"/>
+              </a:rPr>
+              <a:t>"Leach-</a:t>
+            </a:r>
+            <a:r>
+              <a:rPr lang="en-US" altLang="ko-KR" sz="1400" dirty="0" err="1">
+                <a:latin typeface="Aptos" panose="020B0004020202020204" pitchFamily="34" charset="0"/>
+                <a:ea typeface="맑은 고딕" panose="020B0503020000020004" pitchFamily="50" charset="-127"/>
+                <a:cs typeface="Times New Roman" panose="02020603050405020304" pitchFamily="18" charset="0"/>
+              </a:rPr>
+              <a:t>Salz</a:t>
+            </a:r>
+            <a:r>
+              <a:rPr lang="en-US" altLang="ko-KR" sz="1400" dirty="0">
+                <a:latin typeface="Aptos" panose="020B0004020202020204" pitchFamily="34" charset="0"/>
+                <a:ea typeface="맑은 고딕" panose="020B0503020000020004" pitchFamily="50" charset="-127"/>
+                <a:cs typeface="Times New Roman" panose="02020603050405020304" pitchFamily="18" charset="0"/>
+              </a:rPr>
+              <a:t> variant” </a:t>
+            </a:r>
+            <a:r>
+              <a:rPr lang="ko-KR" altLang="en-US" sz="1400" dirty="0">
+                <a:latin typeface="Aptos" panose="020B0004020202020204" pitchFamily="34" charset="0"/>
+                <a:ea typeface="맑은 고딕" panose="020B0503020000020004" pitchFamily="50" charset="-127"/>
+                <a:cs typeface="Times New Roman" panose="02020603050405020304" pitchFamily="18" charset="0"/>
+              </a:rPr>
+              <a:t>입니다</a:t>
+            </a:r>
+            <a:r>
+              <a:rPr lang="en-US" altLang="ko-KR" sz="1400" dirty="0">
+                <a:latin typeface="Aptos" panose="020B0004020202020204" pitchFamily="34" charset="0"/>
+                <a:ea typeface="맑은 고딕" panose="020B0503020000020004" pitchFamily="50" charset="-127"/>
+                <a:cs typeface="Times New Roman" panose="02020603050405020304" pitchFamily="18" charset="0"/>
+              </a:rPr>
+              <a:t>.</a:t>
+            </a:r>
+          </a:p>
+          <a:p>
+            <a:pPr lvl="1"/>
+            <a:endParaRPr lang="en-US" altLang="ko-KR" sz="1600" dirty="0">
+              <a:effectLst/>
+              <a:latin typeface="Aptos" panose="020B0004020202020204" pitchFamily="34" charset="0"/>
+              <a:ea typeface="맑은 고딕" panose="020B0503020000020004" pitchFamily="50" charset="-127"/>
+              <a:cs typeface="Times New Roman" panose="02020603050405020304" pitchFamily="18" charset="0"/>
+            </a:endParaRPr>
+          </a:p>
+          <a:p>
+            <a:pPr lvl="1"/>
+            <a:endParaRPr lang="en-CA" altLang="ko-KR" sz="1600" dirty="0">
+              <a:effectLst/>
+              <a:latin typeface="Aptos" panose="020B0004020202020204" pitchFamily="34" charset="0"/>
+              <a:ea typeface="맑은 고딕" panose="020B0503020000020004" pitchFamily="50" charset="-127"/>
+              <a:cs typeface="Times New Roman" panose="02020603050405020304" pitchFamily="18" charset="0"/>
+            </a:endParaRPr>
+          </a:p>
+          <a:p>
+            <a:pPr lvl="1"/>
+            <a:endParaRPr lang="en-CA" altLang="ko-KR" sz="1600" dirty="0">
+              <a:effectLst/>
+              <a:latin typeface="Aptos" panose="020B0004020202020204" pitchFamily="34" charset="0"/>
+              <a:ea typeface="맑은 고딕" panose="020B0503020000020004" pitchFamily="50" charset="-127"/>
+              <a:cs typeface="Times New Roman" panose="02020603050405020304" pitchFamily="18" charset="0"/>
+            </a:endParaRPr>
+          </a:p>
+          <a:p>
+            <a:endParaRPr lang="en-US" altLang="ko-KR" sz="1600" dirty="0">
+              <a:latin typeface="LiberationSerif"/>
+            </a:endParaRPr>
+          </a:p>
+        </p:txBody>
+      </p:sp>
+    </p:spTree>
+    <p:extLst>
+      <p:ext uri="{BB962C8B-B14F-4D97-AF65-F5344CB8AC3E}">
+        <p14:creationId xmlns:p14="http://schemas.microsoft.com/office/powerpoint/2010/main" val="276120800"/>
+      </p:ext>
+    </p:extLst>
+  </p:cSld>
+  <p:clrMapOvr>
+    <a:masterClrMapping/>
+  </p:clrMapOvr>
+</p:sld>
+</file>
+
+<file path=ppt/slides/slide7.xml><?xml version="1.0" encoding="utf-8"?>
+<p:sld xmlns:a="http://schemas.openxmlformats.org/drawingml/2006/main" xmlns:r="http://schemas.openxmlformats.org/officeDocument/2006/relationships" xmlns:p="http://schemas.openxmlformats.org/presentationml/2006/main">
+  <p:cSld>
+    <p:spTree>
+      <p:nvGrpSpPr>
+        <p:cNvPr id="1" name="">
+          <a:extLst>
+            <a:ext uri="{FF2B5EF4-FFF2-40B4-BE49-F238E27FC236}">
               <a16:creationId xmlns:a16="http://schemas.microsoft.com/office/drawing/2014/main" id="{DAADA819-A4DA-91C2-FA6E-A64B81A9FA8A}"/>
             </a:ext>
           </a:extLst>
@@ -3813,7 +6669,7 @@
               <a:rPr lang="en-US" altLang="ko-KR" sz="1600" dirty="0">
                 <a:latin typeface="LiberationSerif"/>
               </a:rPr>
-              <a:t> feature in a single database server (Ticket Server). To learn more about this, refer to flicker’s engineering blog article [2].</a:t>
+              <a:t> feature in a single database server (Ticket Server).</a:t>
             </a:r>
           </a:p>
           <a:p>
@@ -3821,10 +6677,8 @@
               <a:buNone/>
             </a:pPr>
             <a:r>
-              <a:rPr lang="en-US" altLang="ko-KR" sz="1600" b="1" dirty="0">
-                <a:latin typeface="LiberationSerif"/>
-              </a:rPr>
-              <a:t>Pros:</a:t>
+              <a:rPr lang="en-US" altLang="ko-KR" b="1" dirty="0"/>
+              <a:t>Pros</a:t>
             </a:r>
           </a:p>
           <a:p>
@@ -3848,36 +6702,62 @@
               <a:buNone/>
             </a:pPr>
             <a:r>
-              <a:rPr lang="en-US" altLang="ko-KR" sz="1600" b="1" dirty="0">
-                <a:latin typeface="LiberationSerif"/>
-              </a:rPr>
-              <a:t>Cons:</a:t>
-            </a:r>
-          </a:p>
-          <a:p>
-            <a:r>
-              <a:rPr lang="en-US" altLang="ko-KR" sz="1600" dirty="0">
-                <a:latin typeface="LiberationSerif"/>
-              </a:rPr>
-              <a:t>Single point of failure. Single ticket server means if the ticket server goes down, all systems that depend on it will face issues.</a:t>
-            </a:r>
-          </a:p>
-          <a:p>
-            <a:r>
-              <a:rPr lang="en-US" altLang="ko-KR" sz="1600" dirty="0">
-                <a:latin typeface="LiberationSerif"/>
-              </a:rPr>
-              <a:t>To avoid a single point of failure, we can set up multiple ticket servers.</a:t>
-            </a:r>
-          </a:p>
-          <a:p>
-            <a:r>
-              <a:rPr lang="en-US" altLang="ko-KR" sz="1600" dirty="0">
-                <a:latin typeface="LiberationSerif"/>
-              </a:rPr>
-              <a:t>However, this will introduce new challenges such as data synchronization.</a:t>
+              <a:rPr lang="en-US" altLang="ko-KR" b="1" dirty="0"/>
+              <a:t>Cons</a:t>
+            </a:r>
+          </a:p>
+          <a:p>
+            <a:r>
+              <a:rPr lang="en-US" altLang="ko-KR" sz="1600" dirty="0">
+                <a:solidFill>
+                  <a:srgbClr val="FF0000"/>
+                </a:solidFill>
+                <a:latin typeface="LiberationSerif"/>
+              </a:rPr>
+              <a:t>Single point of failure.</a:t>
+            </a:r>
+            <a:r>
+              <a:rPr lang="en-US" altLang="ko-KR" sz="1600" dirty="0">
+                <a:latin typeface="LiberationSerif"/>
+              </a:rPr>
+              <a:t> Single ticket server means if the ticket server goes down, all systems that depend on it will face issues.</a:t>
+            </a:r>
+          </a:p>
+          <a:p>
+            <a:r>
+              <a:rPr lang="en-US" altLang="ko-KR" sz="1600" dirty="0">
+                <a:latin typeface="LiberationSerif"/>
+              </a:rPr>
+              <a:t>To avoid a single point of failure, we can set up </a:t>
+            </a:r>
+            <a:r>
+              <a:rPr lang="en-US" altLang="ko-KR" sz="1600" dirty="0">
+                <a:solidFill>
+                  <a:srgbClr val="FF0000"/>
+                </a:solidFill>
+                <a:latin typeface="LiberationSerif"/>
+              </a:rPr>
+              <a:t>multiple ticket servers.</a:t>
+            </a:r>
+            <a:r>
+              <a:rPr lang="en-US" altLang="ko-KR" sz="1600" dirty="0">
+                <a:latin typeface="LiberationSerif"/>
+              </a:rPr>
+              <a:t> However, this will introduce </a:t>
+            </a:r>
+            <a:r>
+              <a:rPr lang="en-US" altLang="ko-KR" sz="1600" dirty="0">
+                <a:solidFill>
+                  <a:srgbClr val="FF0000"/>
+                </a:solidFill>
+                <a:latin typeface="LiberationSerif"/>
+              </a:rPr>
+              <a:t>new challenges such as data synchronization.</a:t>
             </a:r>
             <a:endParaRPr lang="ko-KR" altLang="en-US" sz="1600" dirty="0">
+              <a:solidFill>
+                <a:srgbClr val="FF0000"/>
+              </a:solidFill>
               <a:latin typeface="LiberationSerif"/>
             </a:endParaRPr>
           </a:p>
@@ -3926,7 +6806,7 @@
 </p:sld>
 </file>
 
-<file path=ppt/slides/slide7.xml><?xml version="1.0" encoding="utf-8"?>
+<file path=ppt/slides/slide8.xml><?xml version="1.0" encoding="utf-8"?>
 <p:sld xmlns:a="http://schemas.openxmlformats.org/drawingml/2006/main" xmlns:r="http://schemas.openxmlformats.org/officeDocument/2006/relationships" xmlns:p="http://schemas.openxmlformats.org/presentationml/2006/main">
   <p:cSld>
     <p:spTree>
@@ -4054,7 +6934,7 @@
         </p:blipFill>
         <p:spPr>
           <a:xfrm>
-            <a:off x="6096000" y="1272677"/>
+            <a:off x="109568" y="3273670"/>
             <a:ext cx="5986432" cy="977541"/>
           </a:xfrm>
           <a:prstGeom prst="rect">
@@ -4078,8 +6958,8 @@
         </p:nvSpPr>
         <p:spPr>
           <a:xfrm>
-            <a:off x="6201168" y="2464904"/>
-            <a:ext cx="5622422" cy="4012068"/>
+            <a:off x="6201168" y="1205345"/>
+            <a:ext cx="5622422" cy="5271627"/>
           </a:xfrm>
           <a:prstGeom prst="rect">
             <a:avLst/>
@@ -4087,7 +6967,7 @@
         </p:spPr>
         <p:txBody>
           <a:bodyPr vert="horz" lIns="91440" tIns="45720" rIns="91440" bIns="45720" rtlCol="0">
-            <a:normAutofit fontScale="92500" lnSpcReduction="20000"/>
+            <a:normAutofit/>
           </a:bodyPr>
           <a:lstStyle>
             <a:lvl1pPr marL="228600" indent="-228600" algn="l" defTabSz="914400" rtl="0" eaLnBrk="1" latinLnBrk="1" hangingPunct="1">
@@ -4330,7 +7210,16 @@
               <a:rPr lang="en-US" altLang="ko-KR" sz="1400" dirty="0">
                 <a:latin typeface="LiberationSerif"/>
               </a:rPr>
-              <a:t>which gives us 2 ^ 5 = 32 datacenters.</a:t>
+              <a:t>which gives us 2 ^ 5 = </a:t>
+            </a:r>
+            <a:r>
+              <a:rPr lang="en-US" altLang="ko-KR" sz="1400" dirty="0">
+                <a:solidFill>
+                  <a:srgbClr val="FF0000"/>
+                </a:solidFill>
+                <a:latin typeface="LiberationSerif"/>
+              </a:rPr>
+              <a:t>32 datacenters.</a:t>
             </a:r>
           </a:p>
           <a:p>
@@ -4347,7 +7236,16 @@
               <a:rPr lang="en-US" altLang="ko-KR" sz="1400" dirty="0">
                 <a:latin typeface="LiberationSerif"/>
               </a:rPr>
-              <a:t>which gives us 2 ^ 5 = 32 machines per datacenter.</a:t>
+              <a:t>which gives us 2 ^ 5 = </a:t>
+            </a:r>
+            <a:r>
+              <a:rPr lang="en-US" altLang="ko-KR" sz="1400" dirty="0">
+                <a:solidFill>
+                  <a:srgbClr val="FF0000"/>
+                </a:solidFill>
+                <a:latin typeface="LiberationSerif"/>
+              </a:rPr>
+              <a:t>32 machines per datacenter.</a:t>
             </a:r>
           </a:p>
           <a:p>
@@ -4394,7 +7292,7 @@
 </p:sld>
 </file>
 
-<file path=ppt/slides/slide8.xml><?xml version="1.0" encoding="utf-8"?>
+<file path=ppt/slides/slide9.xml><?xml version="1.0" encoding="utf-8"?>
 <p:sld xmlns:a="http://schemas.openxmlformats.org/drawingml/2006/main" xmlns:r="http://schemas.openxmlformats.org/officeDocument/2006/relationships" xmlns:p="http://schemas.openxmlformats.org/presentationml/2006/main">
   <p:cSld>
     <p:spTree>
@@ -4524,7 +7422,18 @@
               <a:rPr lang="en-US" altLang="ko-KR" sz="1600" dirty="0">
                 <a:latin typeface="LiberationSerif"/>
               </a:rPr>
-              <a:t>The maximum timestamp that can be represented in 41 bits is 2 ^ 41 - 1 = 2199023255551 milliseconds (</a:t>
+              <a:t>The maximum timestamp that can be represented in 41 bits is</a:t>
+            </a:r>
+            <a:br>
+              <a:rPr lang="en-US" altLang="ko-KR" sz="1600" dirty="0">
+                <a:latin typeface="LiberationSerif"/>
+              </a:rPr>
+            </a:br>
+            <a:r>
+              <a:rPr lang="en-US" altLang="ko-KR" sz="1600" dirty="0">
+                <a:latin typeface="LiberationSerif"/>
+              </a:rPr>
+              <a:t>2 ^ 41 - 1 = 2,199,023,255,551 milliseconds (</a:t>
             </a:r>
             <a:r>
               <a:rPr lang="en-US" altLang="ko-KR" sz="1600" dirty="0" err="1">
@@ -4536,19 +7445,41 @@
               <a:rPr lang="en-US" altLang="ko-KR" sz="1600" dirty="0">
                 <a:latin typeface="LiberationSerif"/>
               </a:rPr>
-              <a:t>), which gives us: ~ 69 years = 2199023255551 </a:t>
-            </a:r>
-            <a:r>
-              <a:rPr lang="en-US" altLang="ko-KR" sz="1600" dirty="0" err="1">
+              <a:t>),</a:t>
+            </a:r>
+          </a:p>
+          <a:p>
+            <a:pPr lvl="1"/>
+            <a:r>
+              <a:rPr lang="en-US" altLang="ko-KR" sz="1400" dirty="0">
+                <a:latin typeface="LiberationSerif"/>
+              </a:rPr>
+              <a:t>2199023255551 </a:t>
+            </a:r>
+            <a:r>
+              <a:rPr lang="en-US" altLang="ko-KR" sz="1400" dirty="0" err="1">
                 <a:latin typeface="LiberationSerif"/>
               </a:rPr>
               <a:t>ms</a:t>
             </a:r>
             <a:r>
-              <a:rPr lang="en-US" altLang="ko-KR" sz="1600" dirty="0">
-                <a:latin typeface="LiberationSerif"/>
-              </a:rPr>
-              <a:t> / 1000 seconds / 365 days / 24 hours/ 3600 seconds.</a:t>
+              <a:rPr lang="en-US" altLang="ko-KR" sz="1400" dirty="0">
+                <a:latin typeface="LiberationSerif"/>
+              </a:rPr>
+              <a:t> / 1000 (to seconds)/ 3600 (to hours) / 24  (to days) / 365 (to years) </a:t>
+            </a:r>
+            <a:r>
+              <a:rPr lang="en-US" altLang="ko-KR" sz="1400" dirty="0">
+                <a:latin typeface="LiberationSerif"/>
+                <a:sym typeface="Wingdings" panose="05000000000000000000" pitchFamily="2" charset="2"/>
+              </a:rPr>
+              <a:t> </a:t>
+            </a:r>
+            <a:r>
+              <a:rPr lang="en-US" altLang="ko-KR" sz="1400" dirty="0">
+                <a:latin typeface="LiberationSerif"/>
+              </a:rPr>
+              <a:t>69 years</a:t>
             </a:r>
           </a:p>
           <a:p>
@@ -4633,163 +7564,6 @@
     <p:extLst>
       <p:ext uri="{BB962C8B-B14F-4D97-AF65-F5344CB8AC3E}">
         <p14:creationId xmlns:p14="http://schemas.microsoft.com/office/powerpoint/2010/main" val="2658787285"/>
-      </p:ext>
-    </p:extLst>
-  </p:cSld>
-  <p:clrMapOvr>
-    <a:masterClrMapping/>
-  </p:clrMapOvr>
-</p:sld>
-</file>
-
-<file path=ppt/slides/slide9.xml><?xml version="1.0" encoding="utf-8"?>
-<p:sld xmlns:a="http://schemas.openxmlformats.org/drawingml/2006/main" xmlns:r="http://schemas.openxmlformats.org/officeDocument/2006/relationships" xmlns:p="http://schemas.openxmlformats.org/presentationml/2006/main">
-  <p:cSld>
-    <p:spTree>
-      <p:nvGrpSpPr>
-        <p:cNvPr id="1" name="">
-          <a:extLst>
-            <a:ext uri="{FF2B5EF4-FFF2-40B4-BE49-F238E27FC236}">
-              <a16:creationId xmlns:a16="http://schemas.microsoft.com/office/drawing/2014/main" id="{F8B80F7B-B0FF-57D0-DD45-82D5E5C7E5F7}"/>
-            </a:ext>
-          </a:extLst>
-        </p:cNvPr>
-        <p:cNvGrpSpPr/>
-        <p:nvPr/>
-      </p:nvGrpSpPr>
-      <p:grpSpPr>
-        <a:xfrm>
-          <a:off x="0" y="0"/>
-          <a:ext cx="0" cy="0"/>
-          <a:chOff x="0" y="0"/>
-          <a:chExt cx="0" cy="0"/>
-        </a:xfrm>
-      </p:grpSpPr>
-      <p:sp>
-        <p:nvSpPr>
-          <p:cNvPr id="2" name="제목 1">
-            <a:extLst>
-              <a:ext uri="{FF2B5EF4-FFF2-40B4-BE49-F238E27FC236}">
-                <a16:creationId xmlns:a16="http://schemas.microsoft.com/office/drawing/2014/main" id="{A4390147-0449-26B2-1341-5DE341E5511A}"/>
-              </a:ext>
-            </a:extLst>
-          </p:cNvPr>
-          <p:cNvSpPr>
-            <a:spLocks noGrp="1"/>
-          </p:cNvSpPr>
-          <p:nvPr>
-            <p:ph type="title"/>
-          </p:nvPr>
-        </p:nvSpPr>
-        <p:spPr/>
-        <p:txBody>
-          <a:bodyPr/>
-          <a:lstStyle/>
-          <a:p>
-            <a:r>
-              <a:rPr lang="en-US" altLang="ko-KR" dirty="0"/>
-              <a:t>Step 3 - Design deep dive (Twitter snowflake approach)</a:t>
-            </a:r>
-            <a:endParaRPr lang="ko-KR" altLang="en-US" dirty="0"/>
-          </a:p>
-        </p:txBody>
-      </p:sp>
-      <p:sp>
-        <p:nvSpPr>
-          <p:cNvPr id="3" name="내용 개체 틀 2">
-            <a:extLst>
-              <a:ext uri="{FF2B5EF4-FFF2-40B4-BE49-F238E27FC236}">
-                <a16:creationId xmlns:a16="http://schemas.microsoft.com/office/drawing/2014/main" id="{5439E027-BE35-AF19-A722-65259F8454D5}"/>
-              </a:ext>
-            </a:extLst>
-          </p:cNvPr>
-          <p:cNvSpPr>
-            <a:spLocks noGrp="1"/>
-          </p:cNvSpPr>
-          <p:nvPr>
-            <p:ph idx="1"/>
-          </p:nvPr>
-        </p:nvSpPr>
-        <p:spPr>
-          <a:xfrm>
-            <a:off x="372862" y="1260629"/>
-            <a:ext cx="5723138" cy="5232246"/>
-          </a:xfrm>
-        </p:spPr>
-        <p:txBody>
-          <a:bodyPr>
-            <a:normAutofit/>
-          </a:bodyPr>
-          <a:lstStyle/>
-          <a:p>
-            <a:pPr marL="0" indent="0">
-              <a:buNone/>
-            </a:pPr>
-            <a:r>
-              <a:rPr lang="en-CA" altLang="ko-KR" b="1" dirty="0"/>
-              <a:t>Sequence number</a:t>
-            </a:r>
-          </a:p>
-          <a:p>
-            <a:r>
-              <a:rPr lang="en-US" altLang="ko-KR" sz="1600" dirty="0">
-                <a:latin typeface="LiberationSerif"/>
-              </a:rPr>
-              <a:t>Sequence number is 12 bits, which give us 2 ^ 12 = 4096 combinations.</a:t>
-            </a:r>
-          </a:p>
-          <a:p>
-            <a:r>
-              <a:rPr lang="en-US" altLang="ko-KR" sz="1600" dirty="0">
-                <a:latin typeface="LiberationSerif"/>
-              </a:rPr>
-              <a:t>This field is 0 unless more than one ID is generated in a millisecond on the same server.</a:t>
-            </a:r>
-          </a:p>
-          <a:p>
-            <a:r>
-              <a:rPr lang="en-US" altLang="ko-KR" sz="1600" dirty="0">
-                <a:latin typeface="LiberationSerif"/>
-              </a:rPr>
-              <a:t>In theory, a machine can support a maximum of 4096 new IDs per millisecond.</a:t>
-            </a:r>
-          </a:p>
-        </p:txBody>
-      </p:sp>
-      <p:pic>
-        <p:nvPicPr>
-          <p:cNvPr id="6" name="그림 5">
-            <a:extLst>
-              <a:ext uri="{FF2B5EF4-FFF2-40B4-BE49-F238E27FC236}">
-                <a16:creationId xmlns:a16="http://schemas.microsoft.com/office/drawing/2014/main" id="{1696FB22-6699-F088-3040-3F381A529004}"/>
-              </a:ext>
-            </a:extLst>
-          </p:cNvPr>
-          <p:cNvPicPr>
-            <a:picLocks noChangeAspect="1"/>
-          </p:cNvPicPr>
-          <p:nvPr/>
-        </p:nvPicPr>
-        <p:blipFill>
-          <a:blip r:embed="rId2"/>
-          <a:stretch>
-            <a:fillRect/>
-          </a:stretch>
-        </p:blipFill>
-        <p:spPr>
-          <a:xfrm>
-            <a:off x="6096000" y="1280628"/>
-            <a:ext cx="5986432" cy="977541"/>
-          </a:xfrm>
-          <a:prstGeom prst="rect">
-            <a:avLst/>
-          </a:prstGeom>
-        </p:spPr>
-      </p:pic>
-    </p:spTree>
-    <p:extLst>
-      <p:ext uri="{BB962C8B-B14F-4D97-AF65-F5344CB8AC3E}">
-        <p14:creationId xmlns:p14="http://schemas.microsoft.com/office/powerpoint/2010/main" val="1482568066"/>
       </p:ext>
     </p:extLst>
   </p:cSld>

</xml_diff>